<commit_message>
XForm: V0 integrated search site.
</commit_message>
<xml_diff>
--- a/XForm/XForm Demo.pptx
+++ b/XForm/XForm Demo.pptx
@@ -4970,7 +4970,7 @@
           <a:p>
             <a:r>
               <a:rPr lang="en-US" dirty="0"/>
-              <a:t>Current Pipeline</a:t>
+              <a:t>Pipeline Goals</a:t>
             </a:r>
           </a:p>
         </p:txBody>
@@ -4998,75 +4998,53 @@
           </a:bodyPr>
           <a:lstStyle/>
           <a:p>
-            <a:pPr marL="0" indent="0">
-              <a:buNone/>
-            </a:pPr>
-            <a:r>
-              <a:rPr lang="en-US" dirty="0"/>
-              <a:t>One Production and one Pre-Production SQL Server.</a:t>
-            </a:r>
-          </a:p>
-          <a:p>
             <a:pPr fontAlgn="ctr"/>
             <a:r>
               <a:rPr lang="en-US" sz="2000" dirty="0"/>
-              <a:t>Can't be incrementally updated.</a:t>
+              <a:t>Incrementally add new data</a:t>
             </a:r>
           </a:p>
           <a:p>
             <a:pPr fontAlgn="ctr"/>
             <a:r>
               <a:rPr lang="en-US" sz="2000" dirty="0"/>
-              <a:t>Can't compute outputs on different schedules.</a:t>
+              <a:t>Compute outputs on different schedules</a:t>
             </a:r>
           </a:p>
           <a:p>
             <a:pPr fontAlgn="ctr"/>
             <a:r>
               <a:rPr lang="en-US" sz="2000" dirty="0"/>
-              <a:t>Hard to scale out.</a:t>
+              <a:t>Easy scale out</a:t>
             </a:r>
           </a:p>
           <a:p>
             <a:pPr fontAlgn="ctr"/>
             <a:r>
               <a:rPr lang="en-US" sz="2000" dirty="0"/>
-              <a:t>Hard to debug specific steps.</a:t>
+              <a:t>Easy to test changes and debug single steps</a:t>
             </a:r>
           </a:p>
           <a:p>
             <a:pPr fontAlgn="ctr"/>
             <a:r>
               <a:rPr lang="en-US" sz="2000" dirty="0"/>
-              <a:t>Hard to produce consistent reporting.</a:t>
+              <a:t>Easy to generate consistent point-in-time reporting</a:t>
             </a:r>
           </a:p>
           <a:p>
             <a:pPr fontAlgn="ctr"/>
             <a:r>
               <a:rPr lang="en-US" sz="2000" dirty="0"/>
-              <a:t>Hard to produce historical reporting.</a:t>
+              <a:t>Easy to integrate ad-hoc data and experiment</a:t>
             </a:r>
           </a:p>
           <a:p>
             <a:pPr fontAlgn="ctr"/>
             <a:r>
               <a:rPr lang="en-US" sz="2000" dirty="0"/>
-              <a:t>No consistent quality check / failed table / alerting model.</a:t>
-            </a:r>
-          </a:p>
-          <a:p>
-            <a:pPr fontAlgn="ctr"/>
-            <a:r>
-              <a:rPr lang="en-US" sz="2000" dirty="0"/>
-              <a:t>Hard to integrate ad-hoc data with the “trusted” set.</a:t>
-            </a:r>
-          </a:p>
-          <a:p>
-            <a:pPr marL="0" indent="0">
-              <a:buNone/>
-            </a:pPr>
-            <a:endParaRPr lang="en-US" dirty="0"/>
+              <a:t>Consistent quality checking, LKG fallback, and alerting</a:t>
+            </a:r>
           </a:p>
         </p:txBody>
       </p:sp>
@@ -6493,7 +6471,7 @@
         </p:nvGrpSpPr>
         <p:grpSpPr>
           <a:xfrm>
-            <a:off x="1930989" y="4514859"/>
+            <a:off x="1991440" y="4504806"/>
             <a:ext cx="3934438" cy="1166070"/>
             <a:chOff x="536895" y="3758522"/>
             <a:chExt cx="3934438" cy="1166070"/>

</xml_diff>

<commit_message>
XForm: Basics working again with LocalFileStreamProvider.
</commit_message>
<xml_diff>
--- a/XForm/XForm Demo.pptx
+++ b/XForm/XForm Demo.pptx
@@ -210,7 +210,7 @@
           <a:p>
             <a:fld id="{97ADBBF2-A7CD-4A8C-ABF7-AF0D048FF03D}" type="datetimeFigureOut">
               <a:rPr lang="en-US" smtClean="0"/>
-              <a:t>11/30/2017</a:t>
+              <a:t>12/5/2017</a:t>
             </a:fld>
             <a:endParaRPr lang="en-US"/>
           </a:p>
@@ -1464,7 +1464,7 @@
           <a:p>
             <a:fld id="{C77CC684-0172-4053-9258-D128E21FC9EE}" type="datetimeFigureOut">
               <a:rPr lang="en-US" smtClean="0"/>
-              <a:t>11/30/2017</a:t>
+              <a:t>12/5/2017</a:t>
             </a:fld>
             <a:endParaRPr lang="en-US"/>
           </a:p>
@@ -1662,7 +1662,7 @@
           <a:p>
             <a:fld id="{C77CC684-0172-4053-9258-D128E21FC9EE}" type="datetimeFigureOut">
               <a:rPr lang="en-US" smtClean="0"/>
-              <a:t>11/30/2017</a:t>
+              <a:t>12/5/2017</a:t>
             </a:fld>
             <a:endParaRPr lang="en-US"/>
           </a:p>
@@ -1870,7 +1870,7 @@
           <a:p>
             <a:fld id="{C77CC684-0172-4053-9258-D128E21FC9EE}" type="datetimeFigureOut">
               <a:rPr lang="en-US" smtClean="0"/>
-              <a:t>11/30/2017</a:t>
+              <a:t>12/5/2017</a:t>
             </a:fld>
             <a:endParaRPr lang="en-US"/>
           </a:p>
@@ -2068,7 +2068,7 @@
           <a:p>
             <a:fld id="{C77CC684-0172-4053-9258-D128E21FC9EE}" type="datetimeFigureOut">
               <a:rPr lang="en-US" smtClean="0"/>
-              <a:t>11/30/2017</a:t>
+              <a:t>12/5/2017</a:t>
             </a:fld>
             <a:endParaRPr lang="en-US"/>
           </a:p>
@@ -2343,7 +2343,7 @@
           <a:p>
             <a:fld id="{C77CC684-0172-4053-9258-D128E21FC9EE}" type="datetimeFigureOut">
               <a:rPr lang="en-US" smtClean="0"/>
-              <a:t>11/30/2017</a:t>
+              <a:t>12/5/2017</a:t>
             </a:fld>
             <a:endParaRPr lang="en-US"/>
           </a:p>
@@ -2608,7 +2608,7 @@
           <a:p>
             <a:fld id="{C77CC684-0172-4053-9258-D128E21FC9EE}" type="datetimeFigureOut">
               <a:rPr lang="en-US" smtClean="0"/>
-              <a:t>11/30/2017</a:t>
+              <a:t>12/5/2017</a:t>
             </a:fld>
             <a:endParaRPr lang="en-US"/>
           </a:p>
@@ -3020,7 +3020,7 @@
           <a:p>
             <a:fld id="{C77CC684-0172-4053-9258-D128E21FC9EE}" type="datetimeFigureOut">
               <a:rPr lang="en-US" smtClean="0"/>
-              <a:t>11/30/2017</a:t>
+              <a:t>12/5/2017</a:t>
             </a:fld>
             <a:endParaRPr lang="en-US"/>
           </a:p>
@@ -3161,7 +3161,7 @@
           <a:p>
             <a:fld id="{C77CC684-0172-4053-9258-D128E21FC9EE}" type="datetimeFigureOut">
               <a:rPr lang="en-US" smtClean="0"/>
-              <a:t>11/30/2017</a:t>
+              <a:t>12/5/2017</a:t>
             </a:fld>
             <a:endParaRPr lang="en-US"/>
           </a:p>
@@ -3274,7 +3274,7 @@
           <a:p>
             <a:fld id="{C77CC684-0172-4053-9258-D128E21FC9EE}" type="datetimeFigureOut">
               <a:rPr lang="en-US" smtClean="0"/>
-              <a:t>11/30/2017</a:t>
+              <a:t>12/5/2017</a:t>
             </a:fld>
             <a:endParaRPr lang="en-US"/>
           </a:p>
@@ -3585,7 +3585,7 @@
           <a:p>
             <a:fld id="{C77CC684-0172-4053-9258-D128E21FC9EE}" type="datetimeFigureOut">
               <a:rPr lang="en-US" smtClean="0"/>
-              <a:t>11/30/2017</a:t>
+              <a:t>12/5/2017</a:t>
             </a:fld>
             <a:endParaRPr lang="en-US"/>
           </a:p>
@@ -3873,7 +3873,7 @@
           <a:p>
             <a:fld id="{C77CC684-0172-4053-9258-D128E21FC9EE}" type="datetimeFigureOut">
               <a:rPr lang="en-US" smtClean="0"/>
-              <a:t>11/30/2017</a:t>
+              <a:t>12/5/2017</a:t>
             </a:fld>
             <a:endParaRPr lang="en-US"/>
           </a:p>
@@ -4114,7 +4114,7 @@
           <a:p>
             <a:fld id="{C77CC684-0172-4053-9258-D128E21FC9EE}" type="datetimeFigureOut">
               <a:rPr lang="en-US" smtClean="0"/>
-              <a:t>11/30/2017</a:t>
+              <a:t>12/5/2017</a:t>
             </a:fld>
             <a:endParaRPr lang="en-US"/>
           </a:p>
@@ -4886,7 +4886,7 @@
           <a:p>
             <a:r>
               <a:rPr lang="en-US" b="1" dirty="0"/>
-              <a:t>Be our curation pipeline</a:t>
+              <a:t>Be a curation pipeline option</a:t>
             </a:r>
           </a:p>
           <a:p>
@@ -4898,22 +4898,13 @@
           <a:p>
             <a:r>
               <a:rPr lang="en-US" dirty="0"/>
-              <a:t>Power </a:t>
-            </a:r>
-            <a:r>
-              <a:rPr lang="en-US" dirty="0" err="1"/>
-              <a:t>ConfluxSearch</a:t>
-            </a:r>
-            <a:r>
-              <a:rPr lang="en-US" dirty="0"/>
-              <a:t> v2</a:t>
-            </a:r>
-          </a:p>
-          <a:p>
-            <a:r>
-              <a:rPr lang="en-US" dirty="0"/>
-              <a:t>Power ADE v2</a:t>
-            </a:r>
+              <a:t>Enable V2 search </a:t>
+            </a:r>
+            <a:r>
+              <a:rPr lang="en-US"/>
+              <a:t>and graph tools</a:t>
+            </a:r>
+            <a:endParaRPr lang="en-US" dirty="0"/>
           </a:p>
         </p:txBody>
       </p:sp>
@@ -5314,7 +5305,7 @@
             </a:r>
             <a:r>
               <a:rPr lang="en-US" b="1" dirty="0"/>
-              <a:t>WDGIS VSO</a:t>
+              <a:t>VSO</a:t>
             </a:r>
             <a:r>
               <a:rPr lang="en-US" dirty="0"/>
@@ -6116,7 +6107,7 @@
             <a:pPr algn="ctr"/>
             <a:r>
               <a:rPr lang="en-US" dirty="0"/>
-              <a:t>WDGIS.VSO.csv</a:t>
+              <a:t>VSO.csv</a:t>
             </a:r>
           </a:p>
         </p:txBody>

</xml_diff>

<commit_message>
XForm Demo V2 - data processing refocus.
</commit_message>
<xml_diff>
--- a/XForm/XForm Demo.pptx
+++ b/XForm/XForm Demo.pptx
@@ -5,7 +5,7 @@
     <p:sldMasterId id="2147483648" r:id="rId1"/>
   </p:sldMasterIdLst>
   <p:notesMasterIdLst>
-    <p:notesMasterId r:id="rId12"/>
+    <p:notesMasterId r:id="rId11"/>
   </p:notesMasterIdLst>
   <p:sldIdLst>
     <p:sldId id="256" r:id="rId2"/>
@@ -15,9 +15,8 @@
     <p:sldId id="263" r:id="rId6"/>
     <p:sldId id="265" r:id="rId7"/>
     <p:sldId id="266" r:id="rId8"/>
-    <p:sldId id="260" r:id="rId9"/>
-    <p:sldId id="262" r:id="rId10"/>
-    <p:sldId id="264" r:id="rId11"/>
+    <p:sldId id="262" r:id="rId9"/>
+    <p:sldId id="264" r:id="rId10"/>
   </p:sldIdLst>
   <p:sldSz cx="12192000" cy="6858000"/>
   <p:notesSz cx="6858000" cy="9144000"/>
@@ -124,10 +123,6 @@
 </p:presentation>
 </file>
 
-<file path=ppt/revisionInfo.xml><?xml version="1.0" encoding="utf-8"?>
-<p1510:revInfo xmlns:a="http://schemas.openxmlformats.org/drawingml/2006/main" xmlns:r="http://schemas.openxmlformats.org/officeDocument/2006/relationships" xmlns:p1510="http://schemas.microsoft.com/office/powerpoint/2015/10/main"/>
-</file>
-
 <file path=ppt/notesMasters/notesMaster1.xml><?xml version="1.0" encoding="utf-8"?>
 <p:notesMaster xmlns:a="http://schemas.openxmlformats.org/drawingml/2006/main" xmlns:r="http://schemas.openxmlformats.org/officeDocument/2006/relationships" xmlns:p="http://schemas.openxmlformats.org/presentationml/2006/main">
   <p:cSld>
@@ -210,7 +205,7 @@
           <a:p>
             <a:fld id="{97ADBBF2-A7CD-4A8C-ABF7-AF0D048FF03D}" type="datetimeFigureOut">
               <a:rPr lang="en-US" smtClean="0"/>
-              <a:t>12/5/2017</a:t>
+              <a:t>1/7/2018</a:t>
             </a:fld>
             <a:endParaRPr lang="en-US"/>
           </a:p>
@@ -561,90 +556,6 @@
 </p:notes>
 </file>
 
-<file path=ppt/notesSlides/notesSlide10.xml><?xml version="1.0" encoding="utf-8"?>
-<p:notes xmlns:a="http://schemas.openxmlformats.org/drawingml/2006/main" xmlns:r="http://schemas.openxmlformats.org/officeDocument/2006/relationships" xmlns:p="http://schemas.openxmlformats.org/presentationml/2006/main">
-  <p:cSld>
-    <p:spTree>
-      <p:nvGrpSpPr>
-        <p:cNvPr id="1" name=""/>
-        <p:cNvGrpSpPr/>
-        <p:nvPr/>
-      </p:nvGrpSpPr>
-      <p:grpSpPr>
-        <a:xfrm>
-          <a:off x="0" y="0"/>
-          <a:ext cx="0" cy="0"/>
-          <a:chOff x="0" y="0"/>
-          <a:chExt cx="0" cy="0"/>
-        </a:xfrm>
-      </p:grpSpPr>
-      <p:sp>
-        <p:nvSpPr>
-          <p:cNvPr id="2" name="Slide Image Placeholder 1"/>
-          <p:cNvSpPr>
-            <a:spLocks noGrp="1" noRot="1" noChangeAspect="1"/>
-          </p:cNvSpPr>
-          <p:nvPr>
-            <p:ph type="sldImg"/>
-          </p:nvPr>
-        </p:nvSpPr>
-        <p:spPr/>
-      </p:sp>
-      <p:sp>
-        <p:nvSpPr>
-          <p:cNvPr id="3" name="Notes Placeholder 2"/>
-          <p:cNvSpPr>
-            <a:spLocks noGrp="1"/>
-          </p:cNvSpPr>
-          <p:nvPr>
-            <p:ph type="body" idx="1"/>
-          </p:nvPr>
-        </p:nvSpPr>
-        <p:spPr/>
-        <p:txBody>
-          <a:bodyPr/>
-          <a:lstStyle/>
-          <a:p>
-            <a:endParaRPr lang="en-US"/>
-          </a:p>
-        </p:txBody>
-      </p:sp>
-      <p:sp>
-        <p:nvSpPr>
-          <p:cNvPr id="4" name="Slide Number Placeholder 3"/>
-          <p:cNvSpPr>
-            <a:spLocks noGrp="1"/>
-          </p:cNvSpPr>
-          <p:nvPr>
-            <p:ph type="sldNum" sz="quarter" idx="10"/>
-          </p:nvPr>
-        </p:nvSpPr>
-        <p:spPr/>
-        <p:txBody>
-          <a:bodyPr/>
-          <a:lstStyle/>
-          <a:p>
-            <a:fld id="{330F0EB0-B2DD-4C5F-9FCC-122BB4A50FCB}" type="slidenum">
-              <a:rPr lang="en-US" smtClean="0"/>
-              <a:t>10</a:t>
-            </a:fld>
-            <a:endParaRPr lang="en-US"/>
-          </a:p>
-        </p:txBody>
-      </p:sp>
-    </p:spTree>
-    <p:extLst>
-      <p:ext uri="{BB962C8B-B14F-4D97-AF65-F5344CB8AC3E}">
-        <p14:creationId xmlns:p14="http://schemas.microsoft.com/office/powerpoint/2010/main" val="3468568583"/>
-      </p:ext>
-    </p:extLst>
-  </p:cSld>
-  <p:clrMapOvr>
-    <a:masterClrMapping/>
-  </p:clrMapOvr>
-</p:notes>
-</file>
-
 <file path=ppt/notesSlides/notesSlide2.xml><?xml version="1.0" encoding="utf-8"?>
 <p:notes xmlns:a="http://schemas.openxmlformats.org/drawingml/2006/main" xmlns:r="http://schemas.openxmlformats.org/officeDocument/2006/relationships" xmlns:p="http://schemas.openxmlformats.org/presentationml/2006/main">
   <p:cSld>
@@ -1223,7 +1134,7 @@
     </p:spTree>
     <p:extLst>
       <p:ext uri="{BB962C8B-B14F-4D97-AF65-F5344CB8AC3E}">
-        <p14:creationId xmlns:p14="http://schemas.microsoft.com/office/powerpoint/2010/main" val="2963122490"/>
+        <p14:creationId xmlns:p14="http://schemas.microsoft.com/office/powerpoint/2010/main" val="3274611642"/>
       </p:ext>
     </p:extLst>
   </p:cSld>
@@ -1307,7 +1218,7 @@
     </p:spTree>
     <p:extLst>
       <p:ext uri="{BB962C8B-B14F-4D97-AF65-F5344CB8AC3E}">
-        <p14:creationId xmlns:p14="http://schemas.microsoft.com/office/powerpoint/2010/main" val="3274611642"/>
+        <p14:creationId xmlns:p14="http://schemas.microsoft.com/office/powerpoint/2010/main" val="3468568583"/>
       </p:ext>
     </p:extLst>
   </p:cSld>
@@ -1464,7 +1375,7 @@
           <a:p>
             <a:fld id="{C77CC684-0172-4053-9258-D128E21FC9EE}" type="datetimeFigureOut">
               <a:rPr lang="en-US" smtClean="0"/>
-              <a:t>12/5/2017</a:t>
+              <a:t>1/7/2018</a:t>
             </a:fld>
             <a:endParaRPr lang="en-US"/>
           </a:p>
@@ -1662,7 +1573,7 @@
           <a:p>
             <a:fld id="{C77CC684-0172-4053-9258-D128E21FC9EE}" type="datetimeFigureOut">
               <a:rPr lang="en-US" smtClean="0"/>
-              <a:t>12/5/2017</a:t>
+              <a:t>1/7/2018</a:t>
             </a:fld>
             <a:endParaRPr lang="en-US"/>
           </a:p>
@@ -1870,7 +1781,7 @@
           <a:p>
             <a:fld id="{C77CC684-0172-4053-9258-D128E21FC9EE}" type="datetimeFigureOut">
               <a:rPr lang="en-US" smtClean="0"/>
-              <a:t>12/5/2017</a:t>
+              <a:t>1/7/2018</a:t>
             </a:fld>
             <a:endParaRPr lang="en-US"/>
           </a:p>
@@ -2068,7 +1979,7 @@
           <a:p>
             <a:fld id="{C77CC684-0172-4053-9258-D128E21FC9EE}" type="datetimeFigureOut">
               <a:rPr lang="en-US" smtClean="0"/>
-              <a:t>12/5/2017</a:t>
+              <a:t>1/7/2018</a:t>
             </a:fld>
             <a:endParaRPr lang="en-US"/>
           </a:p>
@@ -2343,7 +2254,7 @@
           <a:p>
             <a:fld id="{C77CC684-0172-4053-9258-D128E21FC9EE}" type="datetimeFigureOut">
               <a:rPr lang="en-US" smtClean="0"/>
-              <a:t>12/5/2017</a:t>
+              <a:t>1/7/2018</a:t>
             </a:fld>
             <a:endParaRPr lang="en-US"/>
           </a:p>
@@ -2608,7 +2519,7 @@
           <a:p>
             <a:fld id="{C77CC684-0172-4053-9258-D128E21FC9EE}" type="datetimeFigureOut">
               <a:rPr lang="en-US" smtClean="0"/>
-              <a:t>12/5/2017</a:t>
+              <a:t>1/7/2018</a:t>
             </a:fld>
             <a:endParaRPr lang="en-US"/>
           </a:p>
@@ -3020,7 +2931,7 @@
           <a:p>
             <a:fld id="{C77CC684-0172-4053-9258-D128E21FC9EE}" type="datetimeFigureOut">
               <a:rPr lang="en-US" smtClean="0"/>
-              <a:t>12/5/2017</a:t>
+              <a:t>1/7/2018</a:t>
             </a:fld>
             <a:endParaRPr lang="en-US"/>
           </a:p>
@@ -3161,7 +3072,7 @@
           <a:p>
             <a:fld id="{C77CC684-0172-4053-9258-D128E21FC9EE}" type="datetimeFigureOut">
               <a:rPr lang="en-US" smtClean="0"/>
-              <a:t>12/5/2017</a:t>
+              <a:t>1/7/2018</a:t>
             </a:fld>
             <a:endParaRPr lang="en-US"/>
           </a:p>
@@ -3274,7 +3185,7 @@
           <a:p>
             <a:fld id="{C77CC684-0172-4053-9258-D128E21FC9EE}" type="datetimeFigureOut">
               <a:rPr lang="en-US" smtClean="0"/>
-              <a:t>12/5/2017</a:t>
+              <a:t>1/7/2018</a:t>
             </a:fld>
             <a:endParaRPr lang="en-US"/>
           </a:p>
@@ -3585,7 +3496,7 @@
           <a:p>
             <a:fld id="{C77CC684-0172-4053-9258-D128E21FC9EE}" type="datetimeFigureOut">
               <a:rPr lang="en-US" smtClean="0"/>
-              <a:t>12/5/2017</a:t>
+              <a:t>1/7/2018</a:t>
             </a:fld>
             <a:endParaRPr lang="en-US"/>
           </a:p>
@@ -3873,7 +3784,7 @@
           <a:p>
             <a:fld id="{C77CC684-0172-4053-9258-D128E21FC9EE}" type="datetimeFigureOut">
               <a:rPr lang="en-US" smtClean="0"/>
-              <a:t>12/5/2017</a:t>
+              <a:t>1/7/2018</a:t>
             </a:fld>
             <a:endParaRPr lang="en-US"/>
           </a:p>
@@ -4114,7 +4025,7 @@
           <a:p>
             <a:fld id="{C77CC684-0172-4053-9258-D128E21FC9EE}" type="datetimeFigureOut">
               <a:rPr lang="en-US" smtClean="0"/>
-              <a:t>12/5/2017</a:t>
+              <a:t>1/7/2018</a:t>
             </a:fld>
             <a:endParaRPr lang="en-US"/>
           </a:p>
@@ -4558,14 +4469,6 @@
             </a:r>
             <a:r>
               <a:rPr lang="en-US" dirty="0"/>
-              <a:t> </a:t>
-            </a:r>
-            <a:r>
-              <a:rPr lang="en-US" dirty="0" err="1"/>
-              <a:t>PoC</a:t>
-            </a:r>
-            <a:r>
-              <a:rPr lang="en-US" dirty="0"/>
               <a:t> Demo</a:t>
             </a:r>
           </a:p>
@@ -4594,7 +4497,7 @@
           <a:p>
             <a:r>
               <a:rPr lang="en-US" dirty="0"/>
-              <a:t>11/28/2017</a:t>
+              <a:t>1/8/2018</a:t>
             </a:r>
           </a:p>
         </p:txBody>
@@ -4603,176 +4506,6 @@
     <p:extLst>
       <p:ext uri="{BB962C8B-B14F-4D97-AF65-F5344CB8AC3E}">
         <p14:creationId xmlns:p14="http://schemas.microsoft.com/office/powerpoint/2010/main" val="4250908604"/>
-      </p:ext>
-    </p:extLst>
-  </p:cSld>
-  <p:clrMapOvr>
-    <a:masterClrMapping/>
-  </p:clrMapOvr>
-</p:sld>
-</file>
-
-<file path=ppt/slides/slide10.xml><?xml version="1.0" encoding="utf-8"?>
-<p:sld xmlns:a="http://schemas.openxmlformats.org/drawingml/2006/main" xmlns:r="http://schemas.openxmlformats.org/officeDocument/2006/relationships" xmlns:p="http://schemas.openxmlformats.org/presentationml/2006/main">
-  <p:cSld>
-    <p:spTree>
-      <p:nvGrpSpPr>
-        <p:cNvPr id="1" name=""/>
-        <p:cNvGrpSpPr/>
-        <p:nvPr/>
-      </p:nvGrpSpPr>
-      <p:grpSpPr>
-        <a:xfrm>
-          <a:off x="0" y="0"/>
-          <a:ext cx="0" cy="0"/>
-          <a:chOff x="0" y="0"/>
-          <a:chExt cx="0" cy="0"/>
-        </a:xfrm>
-      </p:grpSpPr>
-      <p:sp>
-        <p:nvSpPr>
-          <p:cNvPr id="2" name="Title 1">
-            <a:extLst>
-              <a:ext uri="{FF2B5EF4-FFF2-40B4-BE49-F238E27FC236}">
-                <a16:creationId xmlns:a16="http://schemas.microsoft.com/office/drawing/2014/main" id="{7538AAF9-F52D-465F-8931-FB75C7997B6A}"/>
-              </a:ext>
-            </a:extLst>
-          </p:cNvPr>
-          <p:cNvSpPr>
-            <a:spLocks noGrp="1"/>
-          </p:cNvSpPr>
-          <p:nvPr>
-            <p:ph type="title"/>
-          </p:nvPr>
-        </p:nvSpPr>
-        <p:spPr/>
-        <p:txBody>
-          <a:bodyPr/>
-          <a:lstStyle/>
-          <a:p>
-            <a:r>
-              <a:rPr lang="en-US" dirty="0"/>
-              <a:t>Next Steps</a:t>
-            </a:r>
-          </a:p>
-        </p:txBody>
-      </p:sp>
-      <p:sp>
-        <p:nvSpPr>
-          <p:cNvPr id="3" name="Content Placeholder 2">
-            <a:extLst>
-              <a:ext uri="{FF2B5EF4-FFF2-40B4-BE49-F238E27FC236}">
-                <a16:creationId xmlns:a16="http://schemas.microsoft.com/office/drawing/2014/main" id="{B8748A51-0ABE-4BAE-8F95-FE29DFB05B3A}"/>
-              </a:ext>
-            </a:extLst>
-          </p:cNvPr>
-          <p:cNvSpPr>
-            <a:spLocks noGrp="1"/>
-          </p:cNvSpPr>
-          <p:nvPr>
-            <p:ph idx="1"/>
-          </p:nvPr>
-        </p:nvSpPr>
-        <p:spPr/>
-        <p:txBody>
-          <a:bodyPr>
-            <a:normAutofit fontScale="92500" lnSpcReduction="20000"/>
-          </a:bodyPr>
-          <a:lstStyle/>
-          <a:p>
-            <a:pPr marL="0" indent="0">
-              <a:buNone/>
-            </a:pPr>
-            <a:r>
-              <a:rPr lang="en-US" dirty="0"/>
-              <a:t>Thanks!</a:t>
-            </a:r>
-          </a:p>
-          <a:p>
-            <a:pPr marL="0" indent="0">
-              <a:buNone/>
-            </a:pPr>
-            <a:r>
-              <a:rPr lang="en-US" dirty="0"/>
-              <a:t>Questions / Feedback?</a:t>
-            </a:r>
-          </a:p>
-          <a:p>
-            <a:pPr marL="0" indent="0">
-              <a:buNone/>
-            </a:pPr>
-            <a:r>
-              <a:rPr lang="en-US" dirty="0"/>
-              <a:t>Try it! </a:t>
-            </a:r>
-            <a:r>
-              <a:rPr lang="en-US" dirty="0">
-                <a:hlinkClick r:id="rId3"/>
-              </a:rPr>
-              <a:t>https://github.com/Microsoft/elfie-arriba/tree/XForm</a:t>
-            </a:r>
-            <a:endParaRPr lang="en-US" dirty="0"/>
-          </a:p>
-          <a:p>
-            <a:pPr marL="0" indent="0">
-              <a:buNone/>
-            </a:pPr>
-            <a:endParaRPr lang="en-US" dirty="0"/>
-          </a:p>
-          <a:p>
-            <a:pPr marL="0" indent="0">
-              <a:buNone/>
-            </a:pPr>
-            <a:r>
-              <a:rPr lang="en-US" dirty="0"/>
-              <a:t>Plans:</a:t>
-            </a:r>
-          </a:p>
-          <a:p>
-            <a:r>
-              <a:rPr lang="en-US" dirty="0"/>
-              <a:t>Finish core model (Log, Fail state, Incremental data, Source share)</a:t>
-            </a:r>
-          </a:p>
-          <a:p>
-            <a:r>
-              <a:rPr lang="en-US" dirty="0"/>
-              <a:t>Language revision/usability</a:t>
-            </a:r>
-          </a:p>
-          <a:p>
-            <a:r>
-              <a:rPr lang="en-US" dirty="0"/>
-              <a:t>Try in limited scenarios</a:t>
-            </a:r>
-          </a:p>
-          <a:p>
-            <a:r>
-              <a:rPr lang="en-US" dirty="0"/>
-              <a:t>Http Service and Web Interface</a:t>
-            </a:r>
-          </a:p>
-          <a:p>
-            <a:r>
-              <a:rPr lang="en-US" dirty="0"/>
-              <a:t>Add critical stages (Or, Group By, Merge, Functions, Latest)</a:t>
-            </a:r>
-          </a:p>
-          <a:p>
-            <a:endParaRPr lang="en-US" dirty="0"/>
-          </a:p>
-          <a:p>
-            <a:pPr marL="0" indent="0">
-              <a:buNone/>
-            </a:pPr>
-            <a:endParaRPr lang="en-US" dirty="0"/>
-          </a:p>
-        </p:txBody>
-      </p:sp>
-    </p:spTree>
-    <p:extLst>
-      <p:ext uri="{BB962C8B-B14F-4D97-AF65-F5344CB8AC3E}">
-        <p14:creationId xmlns:p14="http://schemas.microsoft.com/office/powerpoint/2010/main" val="732147961"/>
       </p:ext>
     </p:extLst>
   </p:cSld>
@@ -4851,7 +4584,12 @@
             <p:ph idx="1"/>
           </p:nvPr>
         </p:nvSpPr>
-        <p:spPr/>
+        <p:spPr>
+          <a:xfrm>
+            <a:off x="838200" y="1825625"/>
+            <a:ext cx="10515600" cy="4351338"/>
+          </a:xfrm>
+        </p:spPr>
         <p:txBody>
           <a:bodyPr/>
           <a:lstStyle/>
@@ -4865,7 +4603,15 @@
             </a:r>
             <a:r>
               <a:rPr lang="en-US" dirty="0"/>
-              <a:t> is a proof-of-concept “agile data pipeline” written in C#.</a:t>
+              <a:t> is a C# data processing engine, like Cosmos/Scope/</a:t>
+            </a:r>
+            <a:r>
+              <a:rPr lang="en-US" dirty="0" err="1"/>
+              <a:t>XFlow</a:t>
+            </a:r>
+            <a:r>
+              <a:rPr lang="en-US" dirty="0"/>
+              <a:t>.</a:t>
             </a:r>
           </a:p>
           <a:p>
@@ -4886,25 +4632,20 @@
           <a:p>
             <a:r>
               <a:rPr lang="en-US" b="1" dirty="0"/>
-              <a:t>Be a curation pipeline option</a:t>
+              <a:t>Enable faster, safer data curation</a:t>
             </a:r>
           </a:p>
           <a:p>
             <a:r>
               <a:rPr lang="en-US" dirty="0"/>
-              <a:t>Integrate data with code-based analysis</a:t>
+              <a:t>Enable easy data-and-code analysis workflows</a:t>
             </a:r>
           </a:p>
           <a:p>
             <a:r>
               <a:rPr lang="en-US" dirty="0"/>
-              <a:t>Enable V2 search </a:t>
-            </a:r>
-            <a:r>
-              <a:rPr lang="en-US"/>
-              <a:t>and graph tools</a:t>
-            </a:r>
-            <a:endParaRPr lang="en-US" dirty="0"/>
+              <a:t>Enable consistent reporting on fast-changing data</a:t>
+            </a:r>
           </a:p>
         </p:txBody>
       </p:sp>
@@ -4961,7 +4702,7 @@
           <a:p>
             <a:r>
               <a:rPr lang="en-US" dirty="0"/>
-              <a:t>Pipeline Goals</a:t>
+              <a:t>Processing Goals</a:t>
             </a:r>
           </a:p>
         </p:txBody>
@@ -4992,6 +4733,41 @@
             <a:pPr fontAlgn="ctr"/>
             <a:r>
               <a:rPr lang="en-US" sz="2000" dirty="0"/>
+              <a:t>Cloud Scale (PB) and easy processing scale-out</a:t>
+            </a:r>
+          </a:p>
+          <a:p>
+            <a:pPr fontAlgn="ctr"/>
+            <a:r>
+              <a:rPr lang="en-US" sz="2000" dirty="0"/>
+              <a:t>Fast to write, test, and debug queries, even locally</a:t>
+            </a:r>
+          </a:p>
+          <a:p>
+            <a:pPr fontAlgn="ctr"/>
+            <a:r>
+              <a:rPr lang="en-US" sz="2000" dirty="0"/>
+              <a:t>Model understands query dependencies itself</a:t>
+            </a:r>
+          </a:p>
+          <a:p>
+            <a:pPr fontAlgn="ctr"/>
+            <a:r>
+              <a:rPr lang="en-US" sz="2000" dirty="0"/>
+              <a:t>Compute outputs on different, desired schedules</a:t>
+            </a:r>
+          </a:p>
+          <a:p>
+            <a:pPr fontAlgn="ctr"/>
+            <a:r>
+              <a:rPr lang="en-US" sz="2000" dirty="0"/>
+              <a:t>Consistent quality checking, LKG fallback, and alerting</a:t>
+            </a:r>
+          </a:p>
+          <a:p>
+            <a:pPr fontAlgn="ctr"/>
+            <a:r>
+              <a:rPr lang="en-US" sz="2000" dirty="0"/>
               <a:t>Incrementally add new data</a:t>
             </a:r>
           </a:p>
@@ -4999,28 +4775,7 @@
             <a:pPr fontAlgn="ctr"/>
             <a:r>
               <a:rPr lang="en-US" sz="2000" dirty="0"/>
-              <a:t>Compute outputs on different schedules</a:t>
-            </a:r>
-          </a:p>
-          <a:p>
-            <a:pPr fontAlgn="ctr"/>
-            <a:r>
-              <a:rPr lang="en-US" sz="2000" dirty="0"/>
-              <a:t>Easy scale out</a:t>
-            </a:r>
-          </a:p>
-          <a:p>
-            <a:pPr fontAlgn="ctr"/>
-            <a:r>
-              <a:rPr lang="en-US" sz="2000" dirty="0"/>
-              <a:t>Easy to test changes and debug single steps</a:t>
-            </a:r>
-          </a:p>
-          <a:p>
-            <a:pPr fontAlgn="ctr"/>
-            <a:r>
-              <a:rPr lang="en-US" sz="2000" dirty="0"/>
-              <a:t>Easy to generate consistent point-in-time reporting</a:t>
+              <a:t>Easy to generate consistent point-in-time reporting and historical reporting</a:t>
             </a:r>
           </a:p>
           <a:p>
@@ -5034,7 +4789,7 @@
             <a:pPr fontAlgn="ctr"/>
             <a:r>
               <a:rPr lang="en-US" sz="2000" dirty="0"/>
-              <a:t>Consistent quality checking, LKG fallback, and alerting</a:t>
+              <a:t>Easy to integrate code for things hard to express in queries</a:t>
             </a:r>
           </a:p>
         </p:txBody>
@@ -5318,7 +5073,7 @@
             </a:pPr>
             <a:r>
               <a:rPr lang="en-US" dirty="0"/>
-              <a:t>I want VSO “Task” cost by the Manager of the assigned user.</a:t>
+              <a:t>I want VSO “Task” cost by the Manager of the task creator.</a:t>
             </a:r>
           </a:p>
           <a:p>
@@ -6380,7 +6135,7 @@
           <a:p>
             <a:r>
               <a:rPr lang="en-US" dirty="0"/>
-              <a:t>Request an output; everything rebuilt from scratch.</a:t>
+              <a:t>Request an output; dependencies rebuilt automatically.</a:t>
             </a:r>
           </a:p>
           <a:p>
@@ -6398,7 +6153,7 @@
           <a:p>
             <a:r>
               <a:rPr lang="en-US" dirty="0"/>
-              <a:t>Write a query interactively and save it.</a:t>
+              <a:t>Write a query interactively with IntelliSense.</a:t>
             </a:r>
           </a:p>
           <a:p>
@@ -6411,6 +6166,12 @@
             <a:r>
               <a:rPr lang="en-US" dirty="0"/>
               <a:t>Show relative performance.</a:t>
+            </a:r>
+          </a:p>
+          <a:p>
+            <a:r>
+              <a:rPr lang="en-US" dirty="0"/>
+              <a:t>Show a custom function.</a:t>
             </a:r>
           </a:p>
           <a:p>
@@ -7389,7 +7150,7 @@
                     <a:schemeClr val="tx1"/>
                   </a:solidFill>
                 </a:rPr>
-                <a:t>Conflux Curated [Cosmos]</a:t>
+                <a:t>Official Dataset [Cloud Storage]</a:t>
               </a:r>
             </a:p>
           </p:txBody>
@@ -8555,7 +8316,7 @@
             <a:pPr algn="ctr"/>
             <a:r>
               <a:rPr lang="en-US" dirty="0"/>
-              <a:t>Cosmos SS</a:t>
+              <a:t>SS</a:t>
             </a:r>
           </a:p>
         </p:txBody>
@@ -8579,108 +8340,6 @@
         <p:spPr>
           <a:xfrm>
             <a:off x="5228883" y="2482440"/>
-            <a:ext cx="964109" cy="0"/>
-          </a:xfrm>
-          <a:prstGeom prst="straightConnector1">
-            <a:avLst/>
-          </a:prstGeom>
-          <a:ln w="25400">
-            <a:solidFill>
-              <a:schemeClr val="accent2"/>
-            </a:solidFill>
-            <a:tailEnd type="triangle"/>
-          </a:ln>
-        </p:spPr>
-        <p:style>
-          <a:lnRef idx="1">
-            <a:schemeClr val="accent6"/>
-          </a:lnRef>
-          <a:fillRef idx="0">
-            <a:schemeClr val="accent6"/>
-          </a:fillRef>
-          <a:effectRef idx="0">
-            <a:schemeClr val="accent6"/>
-          </a:effectRef>
-          <a:fontRef idx="minor">
-            <a:schemeClr val="tx1"/>
-          </a:fontRef>
-        </p:style>
-      </p:cxnSp>
-      <p:sp>
-        <p:nvSpPr>
-          <p:cNvPr id="125" name="Rectangle: Rounded Corners 124">
-            <a:extLst>
-              <a:ext uri="{FF2B5EF4-FFF2-40B4-BE49-F238E27FC236}">
-                <a16:creationId xmlns:a16="http://schemas.microsoft.com/office/drawing/2014/main" id="{BC3E0DDE-3813-4C06-820D-F55C80CCB462}"/>
-              </a:ext>
-            </a:extLst>
-          </p:cNvPr>
-          <p:cNvSpPr/>
-          <p:nvPr/>
-        </p:nvSpPr>
-        <p:spPr>
-          <a:xfrm>
-            <a:off x="6192992" y="4001426"/>
-            <a:ext cx="1301991" cy="488200"/>
-          </a:xfrm>
-          <a:prstGeom prst="roundRect">
-            <a:avLst/>
-          </a:prstGeom>
-          <a:solidFill>
-            <a:schemeClr val="accent2"/>
-          </a:solidFill>
-          <a:ln>
-            <a:prstDash val="dash"/>
-          </a:ln>
-        </p:spPr>
-        <p:style>
-          <a:lnRef idx="2">
-            <a:schemeClr val="accent1">
-              <a:shade val="50000"/>
-            </a:schemeClr>
-          </a:lnRef>
-          <a:fillRef idx="1">
-            <a:schemeClr val="accent1"/>
-          </a:fillRef>
-          <a:effectRef idx="0">
-            <a:schemeClr val="accent1"/>
-          </a:effectRef>
-          <a:fontRef idx="minor">
-            <a:schemeClr val="lt1"/>
-          </a:fontRef>
-        </p:style>
-        <p:txBody>
-          <a:bodyPr rtlCol="0" anchor="ctr"/>
-          <a:lstStyle/>
-          <a:p>
-            <a:pPr algn="ctr"/>
-            <a:r>
-              <a:rPr lang="en-US" sz="1400" dirty="0" err="1"/>
-              <a:t>ConfluxSearch</a:t>
-            </a:r>
-            <a:endParaRPr lang="en-US" sz="1400" dirty="0"/>
-          </a:p>
-        </p:txBody>
-      </p:sp>
-      <p:cxnSp>
-        <p:nvCxnSpPr>
-          <p:cNvPr id="127" name="Straight Arrow Connector 126">
-            <a:extLst>
-              <a:ext uri="{FF2B5EF4-FFF2-40B4-BE49-F238E27FC236}">
-                <a16:creationId xmlns:a16="http://schemas.microsoft.com/office/drawing/2014/main" id="{9CB0860F-93FD-4BDE-92A2-ACB9F39C35C7}"/>
-              </a:ext>
-            </a:extLst>
-          </p:cNvPr>
-          <p:cNvCxnSpPr>
-            <a:cxnSpLocks/>
-            <a:stCxn id="69" idx="3"/>
-            <a:endCxn id="125" idx="1"/>
-          </p:cNvCxnSpPr>
-          <p:nvPr/>
-        </p:nvCxnSpPr>
-        <p:spPr>
-          <a:xfrm>
-            <a:off x="5228883" y="4245526"/>
             <a:ext cx="964109" cy="0"/>
           </a:xfrm>
           <a:prstGeom prst="straightConnector1">
@@ -8761,7 +8420,7 @@
           <a:p>
             <a:r>
               <a:rPr lang="en-US" dirty="0"/>
-              <a:t>Continuous Integration</a:t>
+              <a:t>Change Testing</a:t>
             </a:r>
           </a:p>
         </p:txBody>
@@ -8844,7 +8503,7 @@
                     <a:schemeClr val="tx1"/>
                   </a:solidFill>
                 </a:rPr>
-                <a:t>Conflux Curated [Cosmos]</a:t>
+                <a:t>Official Dataset [Cloud Storage]</a:t>
               </a:r>
             </a:p>
           </p:txBody>
@@ -9250,13 +8909,18 @@
             <a:p>
               <a:pPr algn="ctr"/>
               <a:r>
-                <a:rPr lang="en-US" dirty="0">
+                <a:rPr lang="en-US">
                   <a:solidFill>
                     <a:schemeClr val="tx1"/>
                   </a:solidFill>
                 </a:rPr>
-                <a:t>Test Node 1</a:t>
+                <a:t>Test Node</a:t>
               </a:r>
+              <a:endParaRPr lang="en-US" dirty="0">
+                <a:solidFill>
+                  <a:schemeClr val="tx1"/>
+                </a:solidFill>
+              </a:endParaRPr>
             </a:p>
           </p:txBody>
         </p:sp>
@@ -10151,12 +9815,10 @@
             <a:avLst/>
           </a:prstGeom>
           <a:solidFill>
-            <a:schemeClr val="accent6">
-              <a:lumMod val="75000"/>
-            </a:schemeClr>
+            <a:schemeClr val="accent6"/>
           </a:solidFill>
           <a:ln>
-            <a:prstDash val="dashDot"/>
+            <a:prstDash val="solid"/>
           </a:ln>
         </p:spPr>
         <p:style>
@@ -10632,8 +10294,8 @@
         </p:nvSpPr>
         <p:spPr>
           <a:xfrm>
-            <a:off x="5982778" y="5162227"/>
-            <a:ext cx="1678390" cy="444018"/>
+            <a:off x="7757163" y="5215715"/>
+            <a:ext cx="1996452" cy="444018"/>
           </a:xfrm>
           <a:prstGeom prst="roundRect">
             <a:avLst/>
@@ -10670,7 +10332,7 @@
             <a:pPr algn="ctr"/>
             <a:r>
               <a:rPr lang="en-US" sz="1200" dirty="0" err="1"/>
-              <a:t>Person.Columns.xql</a:t>
+              <a:t>Person.ManagerLookup.xql</a:t>
             </a:r>
             <a:r>
               <a:rPr lang="en-US" sz="1200" dirty="0"/>
@@ -10714,7 +10376,7 @@
           <p:cNvPr id="2" name="Title 1">
             <a:extLst>
               <a:ext uri="{FF2B5EF4-FFF2-40B4-BE49-F238E27FC236}">
-                <a16:creationId xmlns:a16="http://schemas.microsoft.com/office/drawing/2014/main" id="{7B879374-570C-48D7-A96B-9E6614183D36}"/>
+                <a16:creationId xmlns:a16="http://schemas.microsoft.com/office/drawing/2014/main" id="{EBAAAD0B-A2C1-4EF2-8449-A7DB4DEA577A}"/>
               </a:ext>
             </a:extLst>
           </p:cNvPr>
@@ -10731,8 +10393,12 @@
           <a:lstStyle/>
           <a:p>
             <a:r>
+              <a:rPr lang="en-US" dirty="0" err="1"/>
+              <a:t>XForm</a:t>
+            </a:r>
+            <a:r>
               <a:rPr lang="en-US" dirty="0"/>
-              <a:t>Why a code-based engine?</a:t>
+              <a:t> Advantages</a:t>
             </a:r>
           </a:p>
         </p:txBody>
@@ -10742,7 +10408,7 @@
           <p:cNvPr id="3" name="Content Placeholder 2">
             <a:extLst>
               <a:ext uri="{FF2B5EF4-FFF2-40B4-BE49-F238E27FC236}">
-                <a16:creationId xmlns:a16="http://schemas.microsoft.com/office/drawing/2014/main" id="{B31097C9-6438-4389-ABBB-7C59D0FAA249}"/>
+                <a16:creationId xmlns:a16="http://schemas.microsoft.com/office/drawing/2014/main" id="{4EA4CB36-A1CD-48B6-ACC1-7116572C5311}"/>
               </a:ext>
             </a:extLst>
           </p:cNvPr>
@@ -10755,38 +10421,107 @@
         </p:nvSpPr>
         <p:spPr/>
         <p:txBody>
-          <a:bodyPr/>
+          <a:bodyPr>
+            <a:normAutofit fontScale="85000" lnSpcReduction="20000"/>
+          </a:bodyPr>
           <a:lstStyle/>
           <a:p>
+            <a:pPr fontAlgn="ctr"/>
+            <a:r>
+              <a:rPr lang="en-US" b="1" dirty="0"/>
+              <a:t>Interoperable - </a:t>
+            </a:r>
             <a:r>
               <a:rPr lang="en-US" dirty="0"/>
-              <a:t>Continuous Integration for Databases</a:t>
-            </a:r>
-          </a:p>
-          <a:p>
+              <a:t>Store data and process in the cloud or locally.</a:t>
+            </a:r>
+          </a:p>
+          <a:p>
+            <a:pPr fontAlgn="ctr"/>
+            <a:r>
+              <a:rPr lang="en-US" b="1" dirty="0"/>
+              <a:t>Fast</a:t>
+            </a:r>
             <a:r>
               <a:rPr lang="en-US" dirty="0"/>
-              <a:t>Easy scale out and experimentation</a:t>
-            </a:r>
-          </a:p>
-          <a:p>
+              <a:t> – A 4c/8GB machine ingests at gigabit speeds and queries billion row tables with few-second runtimes.</a:t>
+            </a:r>
+          </a:p>
+          <a:p>
+            <a:pPr fontAlgn="ctr"/>
+            <a:r>
+              <a:rPr lang="en-US" b="1" dirty="0"/>
+              <a:t>Fast Cycle </a:t>
+            </a:r>
             <a:r>
               <a:rPr lang="en-US" dirty="0"/>
-              <a:t>Bake our workflow and rules into the model</a:t>
-            </a:r>
-          </a:p>
-          <a:p>
+              <a:t>- Write queries interactively with great IntelliSense in a Web UI and see instant results.</a:t>
+            </a:r>
+          </a:p>
+          <a:p>
+            <a:pPr fontAlgn="ctr"/>
+            <a:r>
+              <a:rPr lang="en-US" b="1" dirty="0"/>
+              <a:t>Workflow Model</a:t>
+            </a:r>
             <a:r>
               <a:rPr lang="en-US" dirty="0"/>
-              <a:t>Integrate code and queries in the pipeline</a:t>
-            </a:r>
+              <a:t> – Dependencies automatically rebuilt, only when needed.</a:t>
+            </a:r>
+          </a:p>
+          <a:p>
+            <a:pPr fontAlgn="ctr"/>
+            <a:r>
+              <a:rPr lang="en-US" b="1" dirty="0"/>
+              <a:t>Validation </a:t>
+            </a:r>
+            <a:r>
+              <a:rPr lang="en-US" dirty="0"/>
+              <a:t>– per-query quality checking, alerting, and fallback.</a:t>
+            </a:r>
+          </a:p>
+          <a:p>
+            <a:pPr fontAlgn="ctr"/>
+            <a:r>
+              <a:rPr lang="en-US" b="1" dirty="0"/>
+              <a:t>Testable</a:t>
+            </a:r>
+            <a:r>
+              <a:rPr lang="en-US" dirty="0"/>
+              <a:t> – Test query changes locally with real production data without risk.</a:t>
+            </a:r>
+          </a:p>
+          <a:p>
+            <a:pPr fontAlgn="ctr"/>
+            <a:r>
+              <a:rPr lang="en-US" b="1" dirty="0"/>
+              <a:t>Interactive -</a:t>
+            </a:r>
+            <a:r>
+              <a:rPr lang="en-US" dirty="0"/>
+              <a:t> Any query can run interactively locally to investigate, explore, or build new queries.</a:t>
+            </a:r>
+          </a:p>
+          <a:p>
+            <a:pPr fontAlgn="ctr"/>
+            <a:r>
+              <a:rPr lang="en-US" b="1" dirty="0"/>
+              <a:t>Extensible</a:t>
+            </a:r>
+            <a:r>
+              <a:rPr lang="en-US" dirty="0"/>
+              <a:t> - Write C# code for things hard to express in queries and plug them in as custom functions or verbs with full fidelity.</a:t>
+            </a:r>
+          </a:p>
+          <a:p>
+            <a:endParaRPr lang="en-US" dirty="0"/>
           </a:p>
         </p:txBody>
       </p:sp>
     </p:spTree>
     <p:extLst>
       <p:ext uri="{BB962C8B-B14F-4D97-AF65-F5344CB8AC3E}">
-        <p14:creationId xmlns:p14="http://schemas.microsoft.com/office/powerpoint/2010/main" val="2497523449"/>
+        <p14:creationId xmlns:p14="http://schemas.microsoft.com/office/powerpoint/2010/main" val="1272496034"/>
       </p:ext>
     </p:extLst>
   </p:cSld>
@@ -10818,7 +10553,7 @@
           <p:cNvPr id="2" name="Title 1">
             <a:extLst>
               <a:ext uri="{FF2B5EF4-FFF2-40B4-BE49-F238E27FC236}">
-                <a16:creationId xmlns:a16="http://schemas.microsoft.com/office/drawing/2014/main" id="{EBAAAD0B-A2C1-4EF2-8449-A7DB4DEA577A}"/>
+                <a16:creationId xmlns:a16="http://schemas.microsoft.com/office/drawing/2014/main" id="{7538AAF9-F52D-465F-8931-FB75C7997B6A}"/>
               </a:ext>
             </a:extLst>
           </p:cNvPr>
@@ -10835,12 +10570,8 @@
           <a:lstStyle/>
           <a:p>
             <a:r>
-              <a:rPr lang="en-US" dirty="0" err="1"/>
-              <a:t>XForm</a:t>
-            </a:r>
-            <a:r>
               <a:rPr lang="en-US" dirty="0"/>
-              <a:t> Advantages</a:t>
+              <a:t>Next Steps</a:t>
             </a:r>
           </a:p>
         </p:txBody>
@@ -10850,7 +10581,7 @@
           <p:cNvPr id="3" name="Content Placeholder 2">
             <a:extLst>
               <a:ext uri="{FF2B5EF4-FFF2-40B4-BE49-F238E27FC236}">
-                <a16:creationId xmlns:a16="http://schemas.microsoft.com/office/drawing/2014/main" id="{4EA4CB36-A1CD-48B6-ACC1-7116572C5311}"/>
+                <a16:creationId xmlns:a16="http://schemas.microsoft.com/office/drawing/2014/main" id="{B8748A51-0ABE-4BAE-8F95-FE29DFB05B3A}"/>
               </a:ext>
             </a:extLst>
           </p:cNvPr>
@@ -10864,64 +10595,80 @@
         <p:spPr/>
         <p:txBody>
           <a:bodyPr>
-            <a:normAutofit lnSpcReduction="10000"/>
+            <a:normAutofit/>
           </a:bodyPr>
           <a:lstStyle/>
           <a:p>
+            <a:pPr marL="0" indent="0">
+              <a:buNone/>
+            </a:pPr>
             <a:r>
               <a:rPr lang="en-US" dirty="0"/>
-              <a:t>Branched – “branched” copies build only different results</a:t>
-            </a:r>
-          </a:p>
-          <a:p>
+              <a:t>Thanks!</a:t>
+            </a:r>
+          </a:p>
+          <a:p>
+            <a:pPr marL="0" indent="0">
+              <a:buNone/>
+            </a:pPr>
             <a:r>
               <a:rPr lang="en-US" dirty="0"/>
-              <a:t>Pull Model – only build outputs when requested; cache intermediates</a:t>
-            </a:r>
-          </a:p>
-          <a:p>
+              <a:t>Questions / Feedback?</a:t>
+            </a:r>
+          </a:p>
+          <a:p>
+            <a:pPr marL="0" indent="0">
+              <a:buNone/>
+            </a:pPr>
             <a:r>
               <a:rPr lang="en-US" dirty="0"/>
-              <a:t>Historical – consistent reporting across sources for any point in time</a:t>
-            </a:r>
-          </a:p>
-          <a:p>
+              <a:t>Try it! </a:t>
+            </a:r>
+            <a:r>
+              <a:rPr lang="en-US" dirty="0">
+                <a:hlinkClick r:id="rId3"/>
+              </a:rPr>
+              <a:t>https://github.com/Microsoft/elfie-arriba/tree/XForm</a:t>
+            </a:r>
+            <a:endParaRPr lang="en-US" dirty="0"/>
+          </a:p>
+          <a:p>
+            <a:pPr marL="0" indent="0">
+              <a:buNone/>
+            </a:pPr>
+            <a:endParaRPr lang="en-US" dirty="0"/>
+          </a:p>
+          <a:p>
+            <a:pPr marL="0" indent="0">
+              <a:buNone/>
+            </a:pPr>
             <a:r>
               <a:rPr lang="en-US" dirty="0"/>
-              <a:t>Incremental – only process updated inputs (and only new rows)</a:t>
+              <a:t>Next Steps:</a:t>
             </a:r>
           </a:p>
           <a:p>
             <a:r>
               <a:rPr lang="en-US" dirty="0"/>
-              <a:t>Safe – queries contain validation; automatic alert and fail path</a:t>
+              <a:t>Use in a first production scenario</a:t>
             </a:r>
           </a:p>
           <a:p>
             <a:r>
               <a:rPr lang="en-US" dirty="0"/>
-              <a:t>Discoverable – IntelliSense and instant results; “promote” to pipeline</a:t>
+              <a:t>Complete core model (Log/Fail state, Cloud store interop)</a:t>
             </a:r>
           </a:p>
           <a:p>
             <a:r>
               <a:rPr lang="en-US" dirty="0"/>
-              <a:t>Extensible – write custom operations and types easily in C#</a:t>
-            </a:r>
-          </a:p>
-          <a:p>
-            <a:r>
-              <a:rPr lang="en-US" dirty="0"/>
-              <a:t>Fast – read CSV/TSV at 200MB/s, count in array faster than LINQ</a:t>
-            </a:r>
-          </a:p>
-          <a:p>
-            <a:r>
-              <a:rPr lang="en-US" dirty="0"/>
-              <a:t>Scalable – workers with shared storage handle distributed queries</a:t>
-            </a:r>
-          </a:p>
-          <a:p>
+              <a:t>Expand language (Group By, Order By, Aggregates, more functions)</a:t>
+            </a:r>
+          </a:p>
+          <a:p>
+            <a:pPr marL="0" indent="0">
+              <a:buNone/>
+            </a:pPr>
             <a:endParaRPr lang="en-US" dirty="0"/>
           </a:p>
         </p:txBody>
@@ -10929,7 +10676,7 @@
     </p:spTree>
     <p:extLst>
       <p:ext uri="{BB962C8B-B14F-4D97-AF65-F5344CB8AC3E}">
-        <p14:creationId xmlns:p14="http://schemas.microsoft.com/office/powerpoint/2010/main" val="1272496034"/>
+        <p14:creationId xmlns:p14="http://schemas.microsoft.com/office/powerpoint/2010/main" val="732147961"/>
       </p:ext>
     </p:extLst>
   </p:cSld>

</xml_diff>

<commit_message>
XForm: Demo - remove Person.Columns (doesn't make sense)
</commit_message>
<xml_diff>
--- a/XForm/XForm Demo.pptx
+++ b/XForm/XForm Demo.pptx
@@ -123,6 +123,10 @@
 </p:presentation>
 </file>
 
+<file path=ppt/revisionInfo.xml><?xml version="1.0" encoding="utf-8"?>
+<p1510:revInfo xmlns:a="http://schemas.openxmlformats.org/drawingml/2006/main" xmlns:r="http://schemas.openxmlformats.org/officeDocument/2006/relationships" xmlns:p1510="http://schemas.microsoft.com/office/powerpoint/2015/10/main"/>
+</file>
+
 <file path=ppt/notesMasters/notesMaster1.xml><?xml version="1.0" encoding="utf-8"?>
 <p:notesMaster xmlns:a="http://schemas.openxmlformats.org/drawingml/2006/main" xmlns:r="http://schemas.openxmlformats.org/officeDocument/2006/relationships" xmlns:p="http://schemas.openxmlformats.org/presentationml/2006/main">
   <p:cSld>
@@ -205,7 +209,7 @@
           <a:p>
             <a:fld id="{97ADBBF2-A7CD-4A8C-ABF7-AF0D048FF03D}" type="datetimeFigureOut">
               <a:rPr lang="en-US" smtClean="0"/>
-              <a:t>1/7/2018</a:t>
+              <a:t>1/8/2018</a:t>
             </a:fld>
             <a:endParaRPr lang="en-US"/>
           </a:p>
@@ -1375,7 +1379,7 @@
           <a:p>
             <a:fld id="{C77CC684-0172-4053-9258-D128E21FC9EE}" type="datetimeFigureOut">
               <a:rPr lang="en-US" smtClean="0"/>
-              <a:t>1/7/2018</a:t>
+              <a:t>1/8/2018</a:t>
             </a:fld>
             <a:endParaRPr lang="en-US"/>
           </a:p>
@@ -1573,7 +1577,7 @@
           <a:p>
             <a:fld id="{C77CC684-0172-4053-9258-D128E21FC9EE}" type="datetimeFigureOut">
               <a:rPr lang="en-US" smtClean="0"/>
-              <a:t>1/7/2018</a:t>
+              <a:t>1/8/2018</a:t>
             </a:fld>
             <a:endParaRPr lang="en-US"/>
           </a:p>
@@ -1781,7 +1785,7 @@
           <a:p>
             <a:fld id="{C77CC684-0172-4053-9258-D128E21FC9EE}" type="datetimeFigureOut">
               <a:rPr lang="en-US" smtClean="0"/>
-              <a:t>1/7/2018</a:t>
+              <a:t>1/8/2018</a:t>
             </a:fld>
             <a:endParaRPr lang="en-US"/>
           </a:p>
@@ -1979,7 +1983,7 @@
           <a:p>
             <a:fld id="{C77CC684-0172-4053-9258-D128E21FC9EE}" type="datetimeFigureOut">
               <a:rPr lang="en-US" smtClean="0"/>
-              <a:t>1/7/2018</a:t>
+              <a:t>1/8/2018</a:t>
             </a:fld>
             <a:endParaRPr lang="en-US"/>
           </a:p>
@@ -2254,7 +2258,7 @@
           <a:p>
             <a:fld id="{C77CC684-0172-4053-9258-D128E21FC9EE}" type="datetimeFigureOut">
               <a:rPr lang="en-US" smtClean="0"/>
-              <a:t>1/7/2018</a:t>
+              <a:t>1/8/2018</a:t>
             </a:fld>
             <a:endParaRPr lang="en-US"/>
           </a:p>
@@ -2519,7 +2523,7 @@
           <a:p>
             <a:fld id="{C77CC684-0172-4053-9258-D128E21FC9EE}" type="datetimeFigureOut">
               <a:rPr lang="en-US" smtClean="0"/>
-              <a:t>1/7/2018</a:t>
+              <a:t>1/8/2018</a:t>
             </a:fld>
             <a:endParaRPr lang="en-US"/>
           </a:p>
@@ -2931,7 +2935,7 @@
           <a:p>
             <a:fld id="{C77CC684-0172-4053-9258-D128E21FC9EE}" type="datetimeFigureOut">
               <a:rPr lang="en-US" smtClean="0"/>
-              <a:t>1/7/2018</a:t>
+              <a:t>1/8/2018</a:t>
             </a:fld>
             <a:endParaRPr lang="en-US"/>
           </a:p>
@@ -3072,7 +3076,7 @@
           <a:p>
             <a:fld id="{C77CC684-0172-4053-9258-D128E21FC9EE}" type="datetimeFigureOut">
               <a:rPr lang="en-US" smtClean="0"/>
-              <a:t>1/7/2018</a:t>
+              <a:t>1/8/2018</a:t>
             </a:fld>
             <a:endParaRPr lang="en-US"/>
           </a:p>
@@ -3185,7 +3189,7 @@
           <a:p>
             <a:fld id="{C77CC684-0172-4053-9258-D128E21FC9EE}" type="datetimeFigureOut">
               <a:rPr lang="en-US" smtClean="0"/>
-              <a:t>1/7/2018</a:t>
+              <a:t>1/8/2018</a:t>
             </a:fld>
             <a:endParaRPr lang="en-US"/>
           </a:p>
@@ -3496,7 +3500,7 @@
           <a:p>
             <a:fld id="{C77CC684-0172-4053-9258-D128E21FC9EE}" type="datetimeFigureOut">
               <a:rPr lang="en-US" smtClean="0"/>
-              <a:t>1/7/2018</a:t>
+              <a:t>1/8/2018</a:t>
             </a:fld>
             <a:endParaRPr lang="en-US"/>
           </a:p>
@@ -3784,7 +3788,7 @@
           <a:p>
             <a:fld id="{C77CC684-0172-4053-9258-D128E21FC9EE}" type="datetimeFigureOut">
               <a:rPr lang="en-US" smtClean="0"/>
-              <a:t>1/7/2018</a:t>
+              <a:t>1/8/2018</a:t>
             </a:fld>
             <a:endParaRPr lang="en-US"/>
           </a:p>
@@ -4025,7 +4029,7 @@
           <a:p>
             <a:fld id="{C77CC684-0172-4053-9258-D128E21FC9EE}" type="datetimeFigureOut">
               <a:rPr lang="en-US" smtClean="0"/>
-              <a:t>1/7/2018</a:t>
+              <a:t>1/8/2018</a:t>
             </a:fld>
             <a:endParaRPr lang="en-US"/>
           </a:p>
@@ -4838,7 +4842,7 @@
         </p:nvSpPr>
         <p:spPr>
           <a:xfrm>
-            <a:off x="9196605" y="2667000"/>
+            <a:off x="7951631" y="2650222"/>
             <a:ext cx="2728514" cy="3916680"/>
           </a:xfrm>
           <a:prstGeom prst="rect">
@@ -4893,8 +4897,8 @@
         </p:nvSpPr>
         <p:spPr>
           <a:xfrm>
-            <a:off x="2529108" y="2667000"/>
-            <a:ext cx="6697439" cy="3916680"/>
+            <a:off x="3258951" y="2650222"/>
+            <a:ext cx="4685424" cy="3916680"/>
           </a:xfrm>
           <a:prstGeom prst="rect">
             <a:avLst/>
@@ -4948,7 +4952,7 @@
         </p:nvSpPr>
         <p:spPr>
           <a:xfrm>
-            <a:off x="396240" y="2667000"/>
+            <a:off x="1126082" y="2650222"/>
             <a:ext cx="2132869" cy="3916680"/>
           </a:xfrm>
           <a:prstGeom prst="rect">
@@ -5098,7 +5102,7 @@
         </p:nvSpPr>
         <p:spPr>
           <a:xfrm>
-            <a:off x="2689133" y="2903583"/>
+            <a:off x="3418975" y="2886805"/>
             <a:ext cx="1291772" cy="638628"/>
           </a:xfrm>
           <a:prstGeom prst="roundRect">
@@ -5138,10 +5142,10 @@
       </p:sp>
       <p:sp>
         <p:nvSpPr>
-          <p:cNvPr id="8" name="Rectangle: Rounded Corners 7">
-            <a:extLst>
-              <a:ext uri="{FF2B5EF4-FFF2-40B4-BE49-F238E27FC236}">
-                <a16:creationId xmlns:a16="http://schemas.microsoft.com/office/drawing/2014/main" id="{8127F4F0-9A94-47E5-9DF2-026B5D452401}"/>
+          <p:cNvPr id="9" name="Rectangle: Rounded Corners 8">
+            <a:extLst>
+              <a:ext uri="{FF2B5EF4-FFF2-40B4-BE49-F238E27FC236}">
+                <a16:creationId xmlns:a16="http://schemas.microsoft.com/office/drawing/2014/main" id="{0B4398D2-9390-4020-8D70-FECBB3A58121}"/>
               </a:ext>
             </a:extLst>
           </p:cNvPr>
@@ -5150,7 +5154,112 @@
         </p:nvSpPr>
         <p:spPr>
           <a:xfrm>
-            <a:off x="4327430" y="2903583"/>
+            <a:off x="5064528" y="2864196"/>
+            <a:ext cx="2569031" cy="638628"/>
+          </a:xfrm>
+          <a:prstGeom prst="roundRect">
+            <a:avLst/>
+          </a:prstGeom>
+          <a:solidFill>
+            <a:schemeClr val="accent6"/>
+          </a:solidFill>
+        </p:spPr>
+        <p:style>
+          <a:lnRef idx="2">
+            <a:schemeClr val="accent1">
+              <a:shade val="50000"/>
+            </a:schemeClr>
+          </a:lnRef>
+          <a:fillRef idx="1">
+            <a:schemeClr val="accent1"/>
+          </a:fillRef>
+          <a:effectRef idx="0">
+            <a:schemeClr val="accent1"/>
+          </a:effectRef>
+          <a:fontRef idx="minor">
+            <a:schemeClr val="lt1"/>
+          </a:fontRef>
+        </p:style>
+        <p:txBody>
+          <a:bodyPr rtlCol="0" anchor="ctr"/>
+          <a:lstStyle/>
+          <a:p>
+            <a:pPr algn="ctr"/>
+            <a:r>
+              <a:rPr lang="en-US" dirty="0" err="1"/>
+              <a:t>Person.ManagerLookup</a:t>
+            </a:r>
+            <a:endParaRPr lang="en-US" dirty="0"/>
+          </a:p>
+        </p:txBody>
+      </p:sp>
+      <p:sp>
+        <p:nvSpPr>
+          <p:cNvPr id="10" name="Rectangle: Rounded Corners 9">
+            <a:extLst>
+              <a:ext uri="{FF2B5EF4-FFF2-40B4-BE49-F238E27FC236}">
+                <a16:creationId xmlns:a16="http://schemas.microsoft.com/office/drawing/2014/main" id="{D24AF8AD-3C53-49C6-8842-E4D2E1F145B8}"/>
+              </a:ext>
+            </a:extLst>
+          </p:cNvPr>
+          <p:cNvSpPr/>
+          <p:nvPr/>
+        </p:nvSpPr>
+        <p:spPr>
+          <a:xfrm>
+            <a:off x="3418975" y="3740087"/>
+            <a:ext cx="1291772" cy="638628"/>
+          </a:xfrm>
+          <a:prstGeom prst="roundRect">
+            <a:avLst/>
+          </a:prstGeom>
+          <a:solidFill>
+            <a:schemeClr val="accent6"/>
+          </a:solidFill>
+        </p:spPr>
+        <p:style>
+          <a:lnRef idx="2">
+            <a:schemeClr val="accent1">
+              <a:shade val="50000"/>
+            </a:schemeClr>
+          </a:lnRef>
+          <a:fillRef idx="1">
+            <a:schemeClr val="accent1"/>
+          </a:fillRef>
+          <a:effectRef idx="0">
+            <a:schemeClr val="accent1"/>
+          </a:effectRef>
+          <a:fontRef idx="minor">
+            <a:schemeClr val="lt1"/>
+          </a:fontRef>
+        </p:style>
+        <p:txBody>
+          <a:bodyPr rtlCol="0" anchor="ctr"/>
+          <a:lstStyle/>
+          <a:p>
+            <a:pPr algn="ctr"/>
+            <a:r>
+              <a:rPr lang="en-US" dirty="0"/>
+              <a:t>VSO</a:t>
+            </a:r>
+          </a:p>
+        </p:txBody>
+      </p:sp>
+      <p:sp>
+        <p:nvSpPr>
+          <p:cNvPr id="11" name="Rectangle: Rounded Corners 10">
+            <a:extLst>
+              <a:ext uri="{FF2B5EF4-FFF2-40B4-BE49-F238E27FC236}">
+                <a16:creationId xmlns:a16="http://schemas.microsoft.com/office/drawing/2014/main" id="{6A036693-8888-4574-A6C4-4AD171FBC0DB}"/>
+              </a:ext>
+            </a:extLst>
+          </p:cNvPr>
+          <p:cNvSpPr/>
+          <p:nvPr/>
+        </p:nvSpPr>
+        <p:spPr>
+          <a:xfrm>
+            <a:off x="5057271" y="3740087"/>
             <a:ext cx="1763487" cy="638628"/>
           </a:xfrm>
           <a:prstGeom prst="roundRect">
@@ -5183,7 +5292,7 @@
             <a:pPr algn="ctr"/>
             <a:r>
               <a:rPr lang="en-US" dirty="0" err="1"/>
-              <a:t>Person.Columns</a:t>
+              <a:t>VSO.Tasks</a:t>
             </a:r>
             <a:endParaRPr lang="en-US" dirty="0"/>
           </a:p>
@@ -5191,10 +5300,10 @@
       </p:sp>
       <p:sp>
         <p:nvSpPr>
-          <p:cNvPr id="9" name="Rectangle: Rounded Corners 8">
-            <a:extLst>
-              <a:ext uri="{FF2B5EF4-FFF2-40B4-BE49-F238E27FC236}">
-                <a16:creationId xmlns:a16="http://schemas.microsoft.com/office/drawing/2014/main" id="{0B4398D2-9390-4020-8D70-FECBB3A58121}"/>
+          <p:cNvPr id="12" name="Rectangle: Rounded Corners 11">
+            <a:extLst>
+              <a:ext uri="{FF2B5EF4-FFF2-40B4-BE49-F238E27FC236}">
+                <a16:creationId xmlns:a16="http://schemas.microsoft.com/office/drawing/2014/main" id="{D2936C13-7137-4F60-8273-6A15A1629072}"/>
               </a:ext>
             </a:extLst>
           </p:cNvPr>
@@ -5203,165 +5312,7 @@
         </p:nvSpPr>
         <p:spPr>
           <a:xfrm>
-            <a:off x="6437442" y="2903583"/>
-            <a:ext cx="2569031" cy="638628"/>
-          </a:xfrm>
-          <a:prstGeom prst="roundRect">
-            <a:avLst/>
-          </a:prstGeom>
-          <a:solidFill>
-            <a:schemeClr val="accent6"/>
-          </a:solidFill>
-        </p:spPr>
-        <p:style>
-          <a:lnRef idx="2">
-            <a:schemeClr val="accent1">
-              <a:shade val="50000"/>
-            </a:schemeClr>
-          </a:lnRef>
-          <a:fillRef idx="1">
-            <a:schemeClr val="accent1"/>
-          </a:fillRef>
-          <a:effectRef idx="0">
-            <a:schemeClr val="accent1"/>
-          </a:effectRef>
-          <a:fontRef idx="minor">
-            <a:schemeClr val="lt1"/>
-          </a:fontRef>
-        </p:style>
-        <p:txBody>
-          <a:bodyPr rtlCol="0" anchor="ctr"/>
-          <a:lstStyle/>
-          <a:p>
-            <a:pPr algn="ctr"/>
-            <a:r>
-              <a:rPr lang="en-US" dirty="0" err="1"/>
-              <a:t>Person.ManagerLookup</a:t>
-            </a:r>
-            <a:endParaRPr lang="en-US" dirty="0"/>
-          </a:p>
-        </p:txBody>
-      </p:sp>
-      <p:sp>
-        <p:nvSpPr>
-          <p:cNvPr id="10" name="Rectangle: Rounded Corners 9">
-            <a:extLst>
-              <a:ext uri="{FF2B5EF4-FFF2-40B4-BE49-F238E27FC236}">
-                <a16:creationId xmlns:a16="http://schemas.microsoft.com/office/drawing/2014/main" id="{D24AF8AD-3C53-49C6-8842-E4D2E1F145B8}"/>
-              </a:ext>
-            </a:extLst>
-          </p:cNvPr>
-          <p:cNvSpPr/>
-          <p:nvPr/>
-        </p:nvSpPr>
-        <p:spPr>
-          <a:xfrm>
-            <a:off x="2689133" y="3756865"/>
-            <a:ext cx="1291772" cy="638628"/>
-          </a:xfrm>
-          <a:prstGeom prst="roundRect">
-            <a:avLst/>
-          </a:prstGeom>
-          <a:solidFill>
-            <a:schemeClr val="accent6"/>
-          </a:solidFill>
-        </p:spPr>
-        <p:style>
-          <a:lnRef idx="2">
-            <a:schemeClr val="accent1">
-              <a:shade val="50000"/>
-            </a:schemeClr>
-          </a:lnRef>
-          <a:fillRef idx="1">
-            <a:schemeClr val="accent1"/>
-          </a:fillRef>
-          <a:effectRef idx="0">
-            <a:schemeClr val="accent1"/>
-          </a:effectRef>
-          <a:fontRef idx="minor">
-            <a:schemeClr val="lt1"/>
-          </a:fontRef>
-        </p:style>
-        <p:txBody>
-          <a:bodyPr rtlCol="0" anchor="ctr"/>
-          <a:lstStyle/>
-          <a:p>
-            <a:pPr algn="ctr"/>
-            <a:r>
-              <a:rPr lang="en-US" dirty="0"/>
-              <a:t>VSO</a:t>
-            </a:r>
-          </a:p>
-        </p:txBody>
-      </p:sp>
-      <p:sp>
-        <p:nvSpPr>
-          <p:cNvPr id="11" name="Rectangle: Rounded Corners 10">
-            <a:extLst>
-              <a:ext uri="{FF2B5EF4-FFF2-40B4-BE49-F238E27FC236}">
-                <a16:creationId xmlns:a16="http://schemas.microsoft.com/office/drawing/2014/main" id="{6A036693-8888-4574-A6C4-4AD171FBC0DB}"/>
-              </a:ext>
-            </a:extLst>
-          </p:cNvPr>
-          <p:cNvSpPr/>
-          <p:nvPr/>
-        </p:nvSpPr>
-        <p:spPr>
-          <a:xfrm>
-            <a:off x="4327429" y="3756865"/>
-            <a:ext cx="1763487" cy="638628"/>
-          </a:xfrm>
-          <a:prstGeom prst="roundRect">
-            <a:avLst/>
-          </a:prstGeom>
-          <a:solidFill>
-            <a:schemeClr val="accent6"/>
-          </a:solidFill>
-        </p:spPr>
-        <p:style>
-          <a:lnRef idx="2">
-            <a:schemeClr val="accent1">
-              <a:shade val="50000"/>
-            </a:schemeClr>
-          </a:lnRef>
-          <a:fillRef idx="1">
-            <a:schemeClr val="accent1"/>
-          </a:fillRef>
-          <a:effectRef idx="0">
-            <a:schemeClr val="accent1"/>
-          </a:effectRef>
-          <a:fontRef idx="minor">
-            <a:schemeClr val="lt1"/>
-          </a:fontRef>
-        </p:style>
-        <p:txBody>
-          <a:bodyPr rtlCol="0" anchor="ctr"/>
-          <a:lstStyle/>
-          <a:p>
-            <a:pPr algn="ctr"/>
-            <a:r>
-              <a:rPr lang="en-US" dirty="0" err="1"/>
-              <a:t>VSO.Tasks</a:t>
-            </a:r>
-            <a:endParaRPr lang="en-US" dirty="0"/>
-          </a:p>
-        </p:txBody>
-      </p:sp>
-      <p:sp>
-        <p:nvSpPr>
-          <p:cNvPr id="12" name="Rectangle: Rounded Corners 11">
-            <a:extLst>
-              <a:ext uri="{FF2B5EF4-FFF2-40B4-BE49-F238E27FC236}">
-                <a16:creationId xmlns:a16="http://schemas.microsoft.com/office/drawing/2014/main" id="{D2936C13-7137-4F60-8273-6A15A1629072}"/>
-              </a:ext>
-            </a:extLst>
-          </p:cNvPr>
-          <p:cNvSpPr/>
-          <p:nvPr/>
-        </p:nvSpPr>
-        <p:spPr>
-          <a:xfrm>
-            <a:off x="9386571" y="4617131"/>
+            <a:off x="8141597" y="4600353"/>
             <a:ext cx="2307771" cy="638628"/>
           </a:xfrm>
           <a:prstGeom prst="roundRect">
@@ -5418,7 +5369,7 @@
         </p:nvCxnSpPr>
         <p:spPr>
           <a:xfrm>
-            <a:off x="2338977" y="3222897"/>
+            <a:off x="3068819" y="3206119"/>
             <a:ext cx="350156" cy="0"/>
           </a:xfrm>
           <a:prstGeom prst="straightConnector1">
@@ -5461,7 +5412,7 @@
         </p:nvCxnSpPr>
         <p:spPr>
           <a:xfrm>
-            <a:off x="2333710" y="4076179"/>
+            <a:off x="3063552" y="4059401"/>
             <a:ext cx="355423" cy="0"/>
           </a:xfrm>
           <a:prstGeom prst="straightConnector1">
@@ -5498,56 +5449,12 @@
           <p:cNvCxnSpPr>
             <a:cxnSpLocks/>
             <a:stCxn id="6" idx="3"/>
-            <a:endCxn id="8" idx="1"/>
           </p:cNvCxnSpPr>
           <p:nvPr/>
         </p:nvCxnSpPr>
         <p:spPr>
           <a:xfrm>
-            <a:off x="3980905" y="3222897"/>
-            <a:ext cx="346525" cy="0"/>
-          </a:xfrm>
-          <a:prstGeom prst="straightConnector1">
-            <a:avLst/>
-          </a:prstGeom>
-          <a:ln w="25400">
-            <a:tailEnd type="triangle"/>
-          </a:ln>
-        </p:spPr>
-        <p:style>
-          <a:lnRef idx="1">
-            <a:schemeClr val="accent1"/>
-          </a:lnRef>
-          <a:fillRef idx="0">
-            <a:schemeClr val="accent1"/>
-          </a:fillRef>
-          <a:effectRef idx="0">
-            <a:schemeClr val="accent1"/>
-          </a:effectRef>
-          <a:fontRef idx="minor">
-            <a:schemeClr val="tx1"/>
-          </a:fontRef>
-        </p:style>
-      </p:cxnSp>
-      <p:cxnSp>
-        <p:nvCxnSpPr>
-          <p:cNvPr id="21" name="Straight Arrow Connector 20">
-            <a:extLst>
-              <a:ext uri="{FF2B5EF4-FFF2-40B4-BE49-F238E27FC236}">
-                <a16:creationId xmlns:a16="http://schemas.microsoft.com/office/drawing/2014/main" id="{12C25492-8F65-4641-908E-580FDC801D76}"/>
-              </a:ext>
-            </a:extLst>
-          </p:cNvPr>
-          <p:cNvCxnSpPr>
-            <a:cxnSpLocks/>
-            <a:stCxn id="8" idx="3"/>
-            <a:endCxn id="9" idx="1"/>
-          </p:cNvCxnSpPr>
-          <p:nvPr/>
-        </p:nvCxnSpPr>
-        <p:spPr>
-          <a:xfrm>
-            <a:off x="6090917" y="3222897"/>
+            <a:off x="4710747" y="3206119"/>
             <a:ext cx="346525" cy="0"/>
           </a:xfrm>
           <a:prstGeom prst="straightConnector1">
@@ -5590,7 +5497,7 @@
         </p:nvCxnSpPr>
         <p:spPr>
           <a:xfrm>
-            <a:off x="3980905" y="4076179"/>
+            <a:off x="4710747" y="4059401"/>
             <a:ext cx="346524" cy="0"/>
           </a:xfrm>
           <a:prstGeom prst="straightConnector1">
@@ -5633,8 +5540,8 @@
         </p:nvCxnSpPr>
         <p:spPr>
           <a:xfrm>
-            <a:off x="9006473" y="3222897"/>
-            <a:ext cx="1533983" cy="685166"/>
+            <a:off x="7633559" y="3183510"/>
+            <a:ext cx="1661923" cy="707775"/>
           </a:xfrm>
           <a:prstGeom prst="curvedConnector2">
             <a:avLst/>
@@ -5672,7 +5579,7 @@
         </p:nvSpPr>
         <p:spPr>
           <a:xfrm>
-            <a:off x="5145670" y="5752341"/>
+            <a:off x="4508106" y="5681214"/>
             <a:ext cx="1291772" cy="638628"/>
           </a:xfrm>
           <a:prstGeom prst="roundRect">
@@ -5727,7 +5634,7 @@
         </p:nvSpPr>
         <p:spPr>
           <a:xfrm>
-            <a:off x="9421948" y="5752341"/>
+            <a:off x="8176974" y="5735563"/>
             <a:ext cx="2307771" cy="638628"/>
           </a:xfrm>
           <a:prstGeom prst="roundRect">
@@ -5782,7 +5689,7 @@
         </p:nvSpPr>
         <p:spPr>
           <a:xfrm>
-            <a:off x="577304" y="2903583"/>
+            <a:off x="1307146" y="2886805"/>
             <a:ext cx="1761673" cy="638628"/>
           </a:xfrm>
           <a:prstGeom prst="flowChartDocument">
@@ -5832,7 +5739,7 @@
         </p:nvSpPr>
         <p:spPr>
           <a:xfrm>
-            <a:off x="579120" y="3756865"/>
+            <a:off x="1308962" y="3740087"/>
             <a:ext cx="1754590" cy="638628"/>
           </a:xfrm>
           <a:prstGeom prst="flowChartDocument">
@@ -5881,7 +5788,7 @@
         </p:nvSpPr>
         <p:spPr>
           <a:xfrm>
-            <a:off x="571944" y="5752341"/>
+            <a:off x="1301786" y="5735563"/>
             <a:ext cx="1761762" cy="616648"/>
           </a:xfrm>
           <a:prstGeom prst="flowChartDocument">
@@ -5933,7 +5840,7 @@
         </p:nvSpPr>
         <p:spPr>
           <a:xfrm>
-            <a:off x="10372340" y="3908063"/>
+            <a:off x="9127366" y="3891285"/>
             <a:ext cx="336232" cy="336232"/>
           </a:xfrm>
           <a:prstGeom prst="ellipse">
@@ -5986,8 +5893,8 @@
         </p:nvCxnSpPr>
         <p:spPr>
           <a:xfrm>
-            <a:off x="6090916" y="4076179"/>
-            <a:ext cx="4281424" cy="0"/>
+            <a:off x="6820758" y="4059401"/>
+            <a:ext cx="2306608" cy="0"/>
           </a:xfrm>
           <a:prstGeom prst="straightConnector1">
             <a:avLst/>
@@ -6029,7 +5936,7 @@
         </p:nvCxnSpPr>
         <p:spPr>
           <a:xfrm>
-            <a:off x="10540456" y="4244295"/>
+            <a:off x="9295482" y="4227517"/>
             <a:ext cx="1" cy="372836"/>
           </a:xfrm>
           <a:prstGeom prst="straightConnector1">
@@ -9646,7 +9553,7 @@
         </p:nvSpPr>
         <p:spPr>
           <a:xfrm>
-            <a:off x="9901371" y="3102552"/>
+            <a:off x="8987279" y="2134532"/>
             <a:ext cx="2120391" cy="1921712"/>
           </a:xfrm>
           <a:prstGeom prst="rect">
@@ -9701,8 +9608,8 @@
         </p:nvSpPr>
         <p:spPr>
           <a:xfrm>
-            <a:off x="4719907" y="3102552"/>
-            <a:ext cx="5204733" cy="1921712"/>
+            <a:off x="5352484" y="2134532"/>
+            <a:ext cx="3658064" cy="1921712"/>
           </a:xfrm>
           <a:prstGeom prst="rect">
             <a:avLst/>
@@ -9756,7 +9663,7 @@
         </p:nvSpPr>
         <p:spPr>
           <a:xfrm>
-            <a:off x="4844266" y="3267041"/>
+            <a:off x="5533533" y="2299021"/>
             <a:ext cx="1003866" cy="444018"/>
           </a:xfrm>
           <a:prstGeom prst="roundRect">
@@ -9796,10 +9703,10 @@
       </p:sp>
       <p:sp>
         <p:nvSpPr>
-          <p:cNvPr id="59" name="Rectangle: Rounded Corners 58">
-            <a:extLst>
-              <a:ext uri="{FF2B5EF4-FFF2-40B4-BE49-F238E27FC236}">
-                <a16:creationId xmlns:a16="http://schemas.microsoft.com/office/drawing/2014/main" id="{BD1BF0E4-41BD-4C4B-9EB9-B6ED134CDF68}"/>
+          <p:cNvPr id="60" name="Rectangle: Rounded Corners 59">
+            <a:extLst>
+              <a:ext uri="{FF2B5EF4-FFF2-40B4-BE49-F238E27FC236}">
+                <a16:creationId xmlns:a16="http://schemas.microsoft.com/office/drawing/2014/main" id="{129F1865-1315-4857-9660-0DE3EB9ADFCF}"/>
               </a:ext>
             </a:extLst>
           </p:cNvPr>
@@ -9808,63 +9715,7 @@
         </p:nvSpPr>
         <p:spPr>
           <a:xfrm>
-            <a:off x="6117424" y="3267041"/>
-            <a:ext cx="1370446" cy="444018"/>
-          </a:xfrm>
-          <a:prstGeom prst="roundRect">
-            <a:avLst/>
-          </a:prstGeom>
-          <a:solidFill>
-            <a:schemeClr val="accent6"/>
-          </a:solidFill>
-          <a:ln>
-            <a:prstDash val="solid"/>
-          </a:ln>
-        </p:spPr>
-        <p:style>
-          <a:lnRef idx="2">
-            <a:schemeClr val="accent1">
-              <a:shade val="50000"/>
-            </a:schemeClr>
-          </a:lnRef>
-          <a:fillRef idx="1">
-            <a:schemeClr val="accent1"/>
-          </a:fillRef>
-          <a:effectRef idx="0">
-            <a:schemeClr val="accent1"/>
-          </a:effectRef>
-          <a:fontRef idx="minor">
-            <a:schemeClr val="lt1"/>
-          </a:fontRef>
-        </p:style>
-        <p:txBody>
-          <a:bodyPr rtlCol="0" anchor="ctr"/>
-          <a:lstStyle/>
-          <a:p>
-            <a:pPr algn="ctr"/>
-            <a:r>
-              <a:rPr lang="en-US" sz="1200" dirty="0" err="1"/>
-              <a:t>Person.Columns</a:t>
-            </a:r>
-            <a:endParaRPr lang="en-US" sz="1200" dirty="0"/>
-          </a:p>
-        </p:txBody>
-      </p:sp>
-      <p:sp>
-        <p:nvSpPr>
-          <p:cNvPr id="60" name="Rectangle: Rounded Corners 59">
-            <a:extLst>
-              <a:ext uri="{FF2B5EF4-FFF2-40B4-BE49-F238E27FC236}">
-                <a16:creationId xmlns:a16="http://schemas.microsoft.com/office/drawing/2014/main" id="{129F1865-1315-4857-9660-0DE3EB9ADFCF}"/>
-              </a:ext>
-            </a:extLst>
-          </p:cNvPr>
-          <p:cNvSpPr/>
-          <p:nvPr/>
-        </p:nvSpPr>
-        <p:spPr>
-          <a:xfrm>
-            <a:off x="7757163" y="3267041"/>
+            <a:off x="6843071" y="2299021"/>
             <a:ext cx="1996453" cy="444018"/>
           </a:xfrm>
           <a:prstGeom prst="roundRect">
@@ -9922,7 +9773,7 @@
         </p:nvSpPr>
         <p:spPr>
           <a:xfrm>
-            <a:off x="6117423" y="3860302"/>
+            <a:off x="6857732" y="2921738"/>
             <a:ext cx="1370446" cy="444018"/>
           </a:xfrm>
           <a:prstGeom prst="roundRect">
@@ -9975,7 +9826,7 @@
         </p:nvSpPr>
         <p:spPr>
           <a:xfrm>
-            <a:off x="10048998" y="4458418"/>
+            <a:off x="9134906" y="3490398"/>
             <a:ext cx="1793422" cy="444018"/>
           </a:xfrm>
           <a:prstGeom prst="roundRect">
@@ -10028,57 +9879,14 @@
           <p:cNvCxnSpPr>
             <a:cxnSpLocks/>
             <a:stCxn id="58" idx="3"/>
-            <a:endCxn id="59" idx="1"/>
-          </p:cNvCxnSpPr>
-          <p:nvPr/>
-        </p:nvCxnSpPr>
-        <p:spPr>
-          <a:xfrm>
-            <a:off x="5848132" y="3489050"/>
-            <a:ext cx="269293" cy="0"/>
-          </a:xfrm>
-          <a:prstGeom prst="straightConnector1">
-            <a:avLst/>
-          </a:prstGeom>
-          <a:ln w="25400">
-            <a:tailEnd type="triangle"/>
-          </a:ln>
-        </p:spPr>
-        <p:style>
-          <a:lnRef idx="1">
-            <a:schemeClr val="accent1"/>
-          </a:lnRef>
-          <a:fillRef idx="0">
-            <a:schemeClr val="accent1"/>
-          </a:fillRef>
-          <a:effectRef idx="0">
-            <a:schemeClr val="accent1"/>
-          </a:effectRef>
-          <a:fontRef idx="minor">
-            <a:schemeClr val="tx1"/>
-          </a:fontRef>
-        </p:style>
-      </p:cxnSp>
-      <p:cxnSp>
-        <p:nvCxnSpPr>
-          <p:cNvPr id="74" name="Straight Arrow Connector 73">
-            <a:extLst>
-              <a:ext uri="{FF2B5EF4-FFF2-40B4-BE49-F238E27FC236}">
-                <a16:creationId xmlns:a16="http://schemas.microsoft.com/office/drawing/2014/main" id="{332BE19F-3C02-4FFA-BB27-D1199645131F}"/>
-              </a:ext>
-            </a:extLst>
-          </p:cNvPr>
-          <p:cNvCxnSpPr>
-            <a:cxnSpLocks/>
-            <a:stCxn id="59" idx="3"/>
             <a:endCxn id="60" idx="1"/>
           </p:cNvCxnSpPr>
           <p:nvPr/>
         </p:nvCxnSpPr>
         <p:spPr>
           <a:xfrm>
-            <a:off x="7487870" y="3489050"/>
-            <a:ext cx="269293" cy="0"/>
+            <a:off x="6537399" y="2521030"/>
+            <a:ext cx="305672" cy="0"/>
           </a:xfrm>
           <a:prstGeom prst="straightConnector1">
             <a:avLst/>
@@ -10120,7 +9928,7 @@
         </p:nvCxnSpPr>
         <p:spPr>
           <a:xfrm>
-            <a:off x="9753615" y="3489050"/>
+            <a:off x="8839523" y="2521030"/>
             <a:ext cx="1192093" cy="476375"/>
           </a:xfrm>
           <a:prstGeom prst="curvedConnector2">
@@ -10159,7 +9967,7 @@
         </p:nvSpPr>
         <p:spPr>
           <a:xfrm>
-            <a:off x="10815062" y="3965425"/>
+            <a:off x="9900970" y="2997405"/>
             <a:ext cx="261294" cy="233772"/>
           </a:xfrm>
           <a:prstGeom prst="ellipse">
@@ -10207,13 +10015,14 @@
           <p:cNvCxnSpPr>
             <a:cxnSpLocks/>
             <a:stCxn id="62" idx="3"/>
+            <a:endCxn id="84" idx="2"/>
           </p:cNvCxnSpPr>
           <p:nvPr/>
         </p:nvCxnSpPr>
         <p:spPr>
-          <a:xfrm>
-            <a:off x="7487869" y="4082311"/>
-            <a:ext cx="3327192" cy="0"/>
+          <a:xfrm flipV="1">
+            <a:off x="8228178" y="3114291"/>
+            <a:ext cx="1672792" cy="29456"/>
           </a:xfrm>
           <a:prstGeom prst="straightConnector1">
             <a:avLst/>
@@ -10255,7 +10064,7 @@
         </p:nvCxnSpPr>
         <p:spPr>
           <a:xfrm>
-            <a:off x="10945709" y="4199197"/>
+            <a:off x="10031617" y="3231177"/>
             <a:ext cx="1" cy="259221"/>
           </a:xfrm>
           <a:prstGeom prst="straightConnector1">
@@ -10294,7 +10103,7 @@
         </p:nvSpPr>
         <p:spPr>
           <a:xfrm>
-            <a:off x="7757163" y="5215715"/>
+            <a:off x="6843071" y="4247695"/>
             <a:ext cx="1996452" cy="444018"/>
           </a:xfrm>
           <a:prstGeom prst="roundRect">

</xml_diff>

<commit_message>
XForm: Website build, Deployment fixes.   - Add missing things to XForm.Web\package.json   - Don't build XForm.Generator to shared bin (not for deployment)   - Write Build.cmd, Deploy.WebSite.cmd to automate web build and copy.
</commit_message>
<xml_diff>
--- a/XForm/XForm Demo.pptx
+++ b/XForm/XForm Demo.pptx
@@ -6130,7 +6130,7 @@
         </p:nvGrpSpPr>
         <p:grpSpPr>
           <a:xfrm>
-            <a:off x="1991440" y="4504806"/>
+            <a:off x="2738060" y="4504806"/>
             <a:ext cx="3934438" cy="1166070"/>
             <a:chOff x="536895" y="3758522"/>
             <a:chExt cx="3934438" cy="1166070"/>
@@ -6554,7 +6554,7 @@
         </p:nvGrpSpPr>
         <p:grpSpPr>
           <a:xfrm>
-            <a:off x="1724326" y="4156982"/>
+            <a:off x="2470946" y="4156982"/>
             <a:ext cx="3934438" cy="1166070"/>
             <a:chOff x="536895" y="3758522"/>
             <a:chExt cx="3934438" cy="1166070"/>
@@ -6993,7 +6993,7 @@
         </p:nvGrpSpPr>
         <p:grpSpPr>
           <a:xfrm>
-            <a:off x="1479004" y="1762650"/>
+            <a:off x="2225624" y="1762650"/>
             <a:ext cx="3934438" cy="1166070"/>
             <a:chOff x="620785" y="1577130"/>
             <a:chExt cx="3934438" cy="1166070"/>
@@ -7057,7 +7057,7 @@
                     <a:schemeClr val="tx1"/>
                   </a:solidFill>
                 </a:rPr>
-                <a:t>Official Dataset [Cloud Storage]</a:t>
+                <a:t>Production Dataset [Cloud Storage]</a:t>
               </a:r>
             </a:p>
           </p:txBody>
@@ -7404,7 +7404,7 @@
         </p:nvGrpSpPr>
         <p:grpSpPr>
           <a:xfrm>
-            <a:off x="1479004" y="3830484"/>
+            <a:off x="2225624" y="3830484"/>
             <a:ext cx="3934438" cy="1166070"/>
             <a:chOff x="536895" y="3758522"/>
             <a:chExt cx="3934438" cy="1166070"/>
@@ -7818,7 +7818,7 @@
         </p:nvCxnSpPr>
         <p:spPr>
           <a:xfrm>
-            <a:off x="2179485" y="2845443"/>
+            <a:off x="2926105" y="2845443"/>
             <a:ext cx="5217" cy="1183091"/>
           </a:xfrm>
           <a:prstGeom prst="straightConnector1">
@@ -7859,7 +7859,7 @@
         </p:nvCxnSpPr>
         <p:spPr>
           <a:xfrm>
-            <a:off x="3200899" y="2753648"/>
+            <a:off x="3947519" y="2753648"/>
             <a:ext cx="0" cy="1274886"/>
           </a:xfrm>
           <a:prstGeom prst="straightConnector1">
@@ -7900,7 +7900,7 @@
         </p:nvCxnSpPr>
         <p:spPr>
           <a:xfrm flipV="1">
-            <a:off x="3691545" y="2742088"/>
+            <a:off x="4438165" y="2742088"/>
             <a:ext cx="1" cy="1286446"/>
           </a:xfrm>
           <a:prstGeom prst="straightConnector1">
@@ -7941,7 +7941,7 @@
         </p:nvCxnSpPr>
         <p:spPr>
           <a:xfrm>
-            <a:off x="4471096" y="2726540"/>
+            <a:off x="5217716" y="2726540"/>
             <a:ext cx="0" cy="1274886"/>
           </a:xfrm>
           <a:prstGeom prst="straightConnector1">
@@ -7985,7 +7985,7 @@
         </p:nvCxnSpPr>
         <p:spPr>
           <a:xfrm flipV="1">
-            <a:off x="4961742" y="2714980"/>
+            <a:off x="5708362" y="2714980"/>
             <a:ext cx="1" cy="1286446"/>
           </a:xfrm>
           <a:prstGeom prst="straightConnector1">
@@ -8027,7 +8027,7 @@
         </p:nvSpPr>
         <p:spPr>
           <a:xfrm>
-            <a:off x="253354" y="2178888"/>
+            <a:off x="999974" y="2178888"/>
             <a:ext cx="1184564" cy="607103"/>
           </a:xfrm>
           <a:prstGeom prst="rightArrow">
@@ -8076,7 +8076,7 @@
         </p:nvSpPr>
         <p:spPr>
           <a:xfrm>
-            <a:off x="6192994" y="1690688"/>
+            <a:off x="6939614" y="1690688"/>
             <a:ext cx="1301991" cy="488200"/>
           </a:xfrm>
           <a:prstGeom prst="roundRect">
@@ -8131,7 +8131,7 @@
         </p:nvSpPr>
         <p:spPr>
           <a:xfrm>
-            <a:off x="6192992" y="2238340"/>
+            <a:off x="6939612" y="2238340"/>
             <a:ext cx="1301991" cy="488200"/>
           </a:xfrm>
           <a:prstGeom prst="roundRect">
@@ -8187,7 +8187,7 @@
         </p:nvSpPr>
         <p:spPr>
           <a:xfrm>
-            <a:off x="6192992" y="2787544"/>
+            <a:off x="6939612" y="2787544"/>
             <a:ext cx="1301991" cy="488200"/>
           </a:xfrm>
           <a:prstGeom prst="roundRect">
@@ -8246,7 +8246,7 @@
         </p:nvCxnSpPr>
         <p:spPr>
           <a:xfrm>
-            <a:off x="5228883" y="2482440"/>
+            <a:off x="5975503" y="2482440"/>
             <a:ext cx="964109" cy="0"/>
           </a:xfrm>
           <a:prstGeom prst="straightConnector1">
@@ -8410,7 +8410,7 @@
                     <a:schemeClr val="tx1"/>
                   </a:solidFill>
                 </a:rPr>
-                <a:t>Official Dataset [Cloud Storage]</a:t>
+                <a:t>Production Dataset [Cloud Storage]</a:t>
               </a:r>
             </a:p>
           </p:txBody>

</xml_diff>

<commit_message>
XForm web fixes   - Save query was double-escaped.   - Add commas when adding columns to query.
</commit_message>
<xml_diff>
--- a/XForm/XForm Demo.pptx
+++ b/XForm/XForm Demo.pptx
@@ -209,7 +209,7 @@
           <a:p>
             <a:fld id="{97ADBBF2-A7CD-4A8C-ABF7-AF0D048FF03D}" type="datetimeFigureOut">
               <a:rPr lang="en-US" smtClean="0"/>
-              <a:t>1/8/2018</a:t>
+              <a:t>1/17/2018</a:t>
             </a:fld>
             <a:endParaRPr lang="en-US"/>
           </a:p>
@@ -1379,7 +1379,7 @@
           <a:p>
             <a:fld id="{C77CC684-0172-4053-9258-D128E21FC9EE}" type="datetimeFigureOut">
               <a:rPr lang="en-US" smtClean="0"/>
-              <a:t>1/8/2018</a:t>
+              <a:t>1/17/2018</a:t>
             </a:fld>
             <a:endParaRPr lang="en-US"/>
           </a:p>
@@ -1577,7 +1577,7 @@
           <a:p>
             <a:fld id="{C77CC684-0172-4053-9258-D128E21FC9EE}" type="datetimeFigureOut">
               <a:rPr lang="en-US" smtClean="0"/>
-              <a:t>1/8/2018</a:t>
+              <a:t>1/17/2018</a:t>
             </a:fld>
             <a:endParaRPr lang="en-US"/>
           </a:p>
@@ -1785,7 +1785,7 @@
           <a:p>
             <a:fld id="{C77CC684-0172-4053-9258-D128E21FC9EE}" type="datetimeFigureOut">
               <a:rPr lang="en-US" smtClean="0"/>
-              <a:t>1/8/2018</a:t>
+              <a:t>1/17/2018</a:t>
             </a:fld>
             <a:endParaRPr lang="en-US"/>
           </a:p>
@@ -1983,7 +1983,7 @@
           <a:p>
             <a:fld id="{C77CC684-0172-4053-9258-D128E21FC9EE}" type="datetimeFigureOut">
               <a:rPr lang="en-US" smtClean="0"/>
-              <a:t>1/8/2018</a:t>
+              <a:t>1/17/2018</a:t>
             </a:fld>
             <a:endParaRPr lang="en-US"/>
           </a:p>
@@ -2258,7 +2258,7 @@
           <a:p>
             <a:fld id="{C77CC684-0172-4053-9258-D128E21FC9EE}" type="datetimeFigureOut">
               <a:rPr lang="en-US" smtClean="0"/>
-              <a:t>1/8/2018</a:t>
+              <a:t>1/17/2018</a:t>
             </a:fld>
             <a:endParaRPr lang="en-US"/>
           </a:p>
@@ -2523,7 +2523,7 @@
           <a:p>
             <a:fld id="{C77CC684-0172-4053-9258-D128E21FC9EE}" type="datetimeFigureOut">
               <a:rPr lang="en-US" smtClean="0"/>
-              <a:t>1/8/2018</a:t>
+              <a:t>1/17/2018</a:t>
             </a:fld>
             <a:endParaRPr lang="en-US"/>
           </a:p>
@@ -2935,7 +2935,7 @@
           <a:p>
             <a:fld id="{C77CC684-0172-4053-9258-D128E21FC9EE}" type="datetimeFigureOut">
               <a:rPr lang="en-US" smtClean="0"/>
-              <a:t>1/8/2018</a:t>
+              <a:t>1/17/2018</a:t>
             </a:fld>
             <a:endParaRPr lang="en-US"/>
           </a:p>
@@ -3076,7 +3076,7 @@
           <a:p>
             <a:fld id="{C77CC684-0172-4053-9258-D128E21FC9EE}" type="datetimeFigureOut">
               <a:rPr lang="en-US" smtClean="0"/>
-              <a:t>1/8/2018</a:t>
+              <a:t>1/17/2018</a:t>
             </a:fld>
             <a:endParaRPr lang="en-US"/>
           </a:p>
@@ -3189,7 +3189,7 @@
           <a:p>
             <a:fld id="{C77CC684-0172-4053-9258-D128E21FC9EE}" type="datetimeFigureOut">
               <a:rPr lang="en-US" smtClean="0"/>
-              <a:t>1/8/2018</a:t>
+              <a:t>1/17/2018</a:t>
             </a:fld>
             <a:endParaRPr lang="en-US"/>
           </a:p>
@@ -3500,7 +3500,7 @@
           <a:p>
             <a:fld id="{C77CC684-0172-4053-9258-D128E21FC9EE}" type="datetimeFigureOut">
               <a:rPr lang="en-US" smtClean="0"/>
-              <a:t>1/8/2018</a:t>
+              <a:t>1/17/2018</a:t>
             </a:fld>
             <a:endParaRPr lang="en-US"/>
           </a:p>
@@ -3788,7 +3788,7 @@
           <a:p>
             <a:fld id="{C77CC684-0172-4053-9258-D128E21FC9EE}" type="datetimeFigureOut">
               <a:rPr lang="en-US" smtClean="0"/>
-              <a:t>1/8/2018</a:t>
+              <a:t>1/17/2018</a:t>
             </a:fld>
             <a:endParaRPr lang="en-US"/>
           </a:p>
@@ -4029,7 +4029,7 @@
           <a:p>
             <a:fld id="{C77CC684-0172-4053-9258-D128E21FC9EE}" type="datetimeFigureOut">
               <a:rPr lang="en-US" smtClean="0"/>
-              <a:t>1/8/2018</a:t>
+              <a:t>1/17/2018</a:t>
             </a:fld>
             <a:endParaRPr lang="en-US"/>
           </a:p>
@@ -6066,23 +6066,8 @@
           <a:p>
             <a:r>
               <a:rPr lang="en-US" dirty="0"/>
-              <a:t>Show “assert” validation and implementation.</a:t>
-            </a:r>
-          </a:p>
-          <a:p>
-            <a:r>
-              <a:rPr lang="en-US" dirty="0"/>
               <a:t>Show relative performance.</a:t>
             </a:r>
-          </a:p>
-          <a:p>
-            <a:r>
-              <a:rPr lang="en-US" dirty="0"/>
-              <a:t>Show a custom function.</a:t>
-            </a:r>
-          </a:p>
-          <a:p>
-            <a:endParaRPr lang="en-US" dirty="0"/>
           </a:p>
         </p:txBody>
       </p:sp>

</xml_diff>